<commit_message>
finish regression hospital table
</commit_message>
<xml_diff>
--- a/Data_Map.pptx
+++ b/Data_Map.pptx
@@ -2,16 +2,16 @@
 <file path=ppt/presentation.xml><?xml version="1.0" encoding="utf-8"?>
 <p:presentation xmlns:a="http://schemas.openxmlformats.org/drawingml/2006/main" xmlns:r="http://schemas.openxmlformats.org/officeDocument/2006/relationships" xmlns:p="http://schemas.openxmlformats.org/presentationml/2006/main" saveSubsetFonts="1" autoCompressPictures="0">
   <p:sldMasterIdLst>
-    <p:sldMasterId id="2147483660" r:id="rId1"/>
+    <p:sldMasterId id="2147483672" r:id="rId1"/>
   </p:sldMasterIdLst>
   <p:sldIdLst>
-    <p:sldId id="256" r:id="rId2"/>
-    <p:sldId id="257" r:id="rId3"/>
-    <p:sldId id="258" r:id="rId4"/>
-    <p:sldId id="259" r:id="rId5"/>
-    <p:sldId id="260" r:id="rId6"/>
+    <p:sldId id="260" r:id="rId2"/>
+    <p:sldId id="261" r:id="rId3"/>
+    <p:sldId id="262" r:id="rId4"/>
+    <p:sldId id="263" r:id="rId5"/>
+    <p:sldId id="264" r:id="rId6"/>
   </p:sldIdLst>
-  <p:sldSz cx="12192000" cy="8229600"/>
+  <p:sldSz cx="12192000" cy="10972800"/>
   <p:notesSz cx="6858000" cy="9144000"/>
   <p:defaultTextStyle>
     <a:defPPr>
@@ -140,15 +140,15 @@
         </p:nvSpPr>
         <p:spPr>
           <a:xfrm>
-            <a:off x="914400" y="1346836"/>
-            <a:ext cx="10363200" cy="2865120"/>
+            <a:off x="914400" y="1795781"/>
+            <a:ext cx="10363200" cy="3820160"/>
           </a:xfrm>
         </p:spPr>
         <p:txBody>
           <a:bodyPr anchor="b"/>
           <a:lstStyle>
             <a:lvl1pPr algn="ctr">
-              <a:defRPr sz="7200"/>
+              <a:defRPr sz="8000"/>
             </a:lvl1pPr>
           </a:lstStyle>
           <a:p>
@@ -172,8 +172,8 @@
         </p:nvSpPr>
         <p:spPr>
           <a:xfrm>
-            <a:off x="1524000" y="4322446"/>
-            <a:ext cx="9144000" cy="1986914"/>
+            <a:off x="1524000" y="5763261"/>
+            <a:ext cx="9144000" cy="2649219"/>
           </a:xfrm>
         </p:spPr>
         <p:txBody>
@@ -181,39 +181,39 @@
           <a:lstStyle>
             <a:lvl1pPr marL="0" indent="0" algn="ctr">
               <a:buNone/>
-              <a:defRPr sz="2880"/>
+              <a:defRPr sz="3200"/>
             </a:lvl1pPr>
-            <a:lvl2pPr marL="548640" indent="0" algn="ctr">
+            <a:lvl2pPr marL="609585" indent="0" algn="ctr">
+              <a:buNone/>
+              <a:defRPr sz="2667"/>
+            </a:lvl2pPr>
+            <a:lvl3pPr marL="1219170" indent="0" algn="ctr">
               <a:buNone/>
               <a:defRPr sz="2400"/>
-            </a:lvl2pPr>
-            <a:lvl3pPr marL="1097280" indent="0" algn="ctr">
+            </a:lvl3pPr>
+            <a:lvl4pPr marL="1828754" indent="0" algn="ctr">
               <a:buNone/>
-              <a:defRPr sz="2160"/>
-            </a:lvl3pPr>
-            <a:lvl4pPr marL="1645920" indent="0" algn="ctr">
+              <a:defRPr sz="2133"/>
+            </a:lvl4pPr>
+            <a:lvl5pPr marL="2438339" indent="0" algn="ctr">
               <a:buNone/>
-              <a:defRPr sz="1920"/>
-            </a:lvl4pPr>
-            <a:lvl5pPr marL="2194560" indent="0" algn="ctr">
+              <a:defRPr sz="2133"/>
+            </a:lvl5pPr>
+            <a:lvl6pPr marL="3047924" indent="0" algn="ctr">
               <a:buNone/>
-              <a:defRPr sz="1920"/>
-            </a:lvl5pPr>
-            <a:lvl6pPr marL="2743200" indent="0" algn="ctr">
+              <a:defRPr sz="2133"/>
+            </a:lvl6pPr>
+            <a:lvl7pPr marL="3657509" indent="0" algn="ctr">
               <a:buNone/>
-              <a:defRPr sz="1920"/>
-            </a:lvl6pPr>
-            <a:lvl7pPr marL="3291840" indent="0" algn="ctr">
+              <a:defRPr sz="2133"/>
+            </a:lvl7pPr>
+            <a:lvl8pPr marL="4267093" indent="0" algn="ctr">
               <a:buNone/>
-              <a:defRPr sz="1920"/>
-            </a:lvl7pPr>
-            <a:lvl8pPr marL="3840480" indent="0" algn="ctr">
+              <a:defRPr sz="2133"/>
+            </a:lvl8pPr>
+            <a:lvl9pPr marL="4876678" indent="0" algn="ctr">
               <a:buNone/>
-              <a:defRPr sz="1920"/>
-            </a:lvl8pPr>
-            <a:lvl9pPr marL="4389120" indent="0" algn="ctr">
-              <a:buNone/>
-              <a:defRPr sz="1920"/>
+              <a:defRPr sz="2133"/>
             </a:lvl9pPr>
           </a:lstStyle>
           <a:p>
@@ -293,7 +293,7 @@
     </p:spTree>
     <p:extLst>
       <p:ext uri="{BB962C8B-B14F-4D97-AF65-F5344CB8AC3E}">
-        <p14:creationId xmlns:p14="http://schemas.microsoft.com/office/powerpoint/2010/main" val="1549481058"/>
+        <p14:creationId xmlns:p14="http://schemas.microsoft.com/office/powerpoint/2010/main" val="1788338402"/>
       </p:ext>
     </p:extLst>
   </p:cSld>
@@ -463,7 +463,7 @@
     </p:spTree>
     <p:extLst>
       <p:ext uri="{BB962C8B-B14F-4D97-AF65-F5344CB8AC3E}">
-        <p14:creationId xmlns:p14="http://schemas.microsoft.com/office/powerpoint/2010/main" val="2919836987"/>
+        <p14:creationId xmlns:p14="http://schemas.microsoft.com/office/powerpoint/2010/main" val="4204968356"/>
       </p:ext>
     </p:extLst>
   </p:cSld>
@@ -502,8 +502,8 @@
         </p:nvSpPr>
         <p:spPr>
           <a:xfrm>
-            <a:off x="8724901" y="438150"/>
-            <a:ext cx="2628900" cy="6974206"/>
+            <a:off x="8724901" y="584200"/>
+            <a:ext cx="2628900" cy="9298941"/>
           </a:xfrm>
         </p:spPr>
         <p:txBody>
@@ -530,8 +530,8 @@
         </p:nvSpPr>
         <p:spPr>
           <a:xfrm>
-            <a:off x="838201" y="438150"/>
-            <a:ext cx="7734300" cy="6974206"/>
+            <a:off x="838201" y="584200"/>
+            <a:ext cx="7734300" cy="9298941"/>
           </a:xfrm>
         </p:spPr>
         <p:txBody>
@@ -643,7 +643,7 @@
     </p:spTree>
     <p:extLst>
       <p:ext uri="{BB962C8B-B14F-4D97-AF65-F5344CB8AC3E}">
-        <p14:creationId xmlns:p14="http://schemas.microsoft.com/office/powerpoint/2010/main" val="2004692515"/>
+        <p14:creationId xmlns:p14="http://schemas.microsoft.com/office/powerpoint/2010/main" val="1937033358"/>
       </p:ext>
     </p:extLst>
   </p:cSld>
@@ -813,7 +813,7 @@
     </p:spTree>
     <p:extLst>
       <p:ext uri="{BB962C8B-B14F-4D97-AF65-F5344CB8AC3E}">
-        <p14:creationId xmlns:p14="http://schemas.microsoft.com/office/powerpoint/2010/main" val="458249469"/>
+        <p14:creationId xmlns:p14="http://schemas.microsoft.com/office/powerpoint/2010/main" val="3594110016"/>
       </p:ext>
     </p:extLst>
   </p:cSld>
@@ -852,15 +852,15 @@
         </p:nvSpPr>
         <p:spPr>
           <a:xfrm>
-            <a:off x="831851" y="2051688"/>
-            <a:ext cx="10515600" cy="3423284"/>
+            <a:off x="831851" y="2735583"/>
+            <a:ext cx="10515600" cy="4564379"/>
           </a:xfrm>
         </p:spPr>
         <p:txBody>
           <a:bodyPr anchor="b"/>
           <a:lstStyle>
             <a:lvl1pPr>
-              <a:defRPr sz="7200"/>
+              <a:defRPr sz="8000"/>
             </a:lvl1pPr>
           </a:lstStyle>
           <a:p>
@@ -884,8 +884,8 @@
         </p:nvSpPr>
         <p:spPr>
           <a:xfrm>
-            <a:off x="831851" y="5507358"/>
-            <a:ext cx="10515600" cy="1800224"/>
+            <a:off x="831851" y="7343143"/>
+            <a:ext cx="10515600" cy="2400299"/>
           </a:xfrm>
         </p:spPr>
         <p:txBody>
@@ -893,13 +893,23 @@
           <a:lstStyle>
             <a:lvl1pPr marL="0" indent="0">
               <a:buNone/>
-              <a:defRPr sz="2880">
+              <a:defRPr sz="3200">
                 <a:solidFill>
                   <a:schemeClr val="tx1"/>
                 </a:solidFill>
               </a:defRPr>
             </a:lvl1pPr>
-            <a:lvl2pPr marL="548640" indent="0">
+            <a:lvl2pPr marL="609585" indent="0">
+              <a:buNone/>
+              <a:defRPr sz="2667">
+                <a:solidFill>
+                  <a:schemeClr val="tx1">
+                    <a:tint val="75000"/>
+                  </a:schemeClr>
+                </a:solidFill>
+              </a:defRPr>
+            </a:lvl2pPr>
+            <a:lvl3pPr marL="1219170" indent="0">
               <a:buNone/>
               <a:defRPr sz="2400">
                 <a:solidFill>
@@ -908,20 +918,10 @@
                   </a:schemeClr>
                 </a:solidFill>
               </a:defRPr>
-            </a:lvl2pPr>
-            <a:lvl3pPr marL="1097280" indent="0">
+            </a:lvl3pPr>
+            <a:lvl4pPr marL="1828754" indent="0">
               <a:buNone/>
-              <a:defRPr sz="2160">
-                <a:solidFill>
-                  <a:schemeClr val="tx1">
-                    <a:tint val="75000"/>
-                  </a:schemeClr>
-                </a:solidFill>
-              </a:defRPr>
-            </a:lvl3pPr>
-            <a:lvl4pPr marL="1645920" indent="0">
-              <a:buNone/>
-              <a:defRPr sz="1920">
+              <a:defRPr sz="2133">
                 <a:solidFill>
                   <a:schemeClr val="tx1">
                     <a:tint val="75000"/>
@@ -929,9 +929,9 @@
                 </a:solidFill>
               </a:defRPr>
             </a:lvl4pPr>
-            <a:lvl5pPr marL="2194560" indent="0">
+            <a:lvl5pPr marL="2438339" indent="0">
               <a:buNone/>
-              <a:defRPr sz="1920">
+              <a:defRPr sz="2133">
                 <a:solidFill>
                   <a:schemeClr val="tx1">
                     <a:tint val="75000"/>
@@ -939,9 +939,9 @@
                 </a:solidFill>
               </a:defRPr>
             </a:lvl5pPr>
-            <a:lvl6pPr marL="2743200" indent="0">
+            <a:lvl6pPr marL="3047924" indent="0">
               <a:buNone/>
-              <a:defRPr sz="1920">
+              <a:defRPr sz="2133">
                 <a:solidFill>
                   <a:schemeClr val="tx1">
                     <a:tint val="75000"/>
@@ -949,9 +949,9 @@
                 </a:solidFill>
               </a:defRPr>
             </a:lvl6pPr>
-            <a:lvl7pPr marL="3291840" indent="0">
+            <a:lvl7pPr marL="3657509" indent="0">
               <a:buNone/>
-              <a:defRPr sz="1920">
+              <a:defRPr sz="2133">
                 <a:solidFill>
                   <a:schemeClr val="tx1">
                     <a:tint val="75000"/>
@@ -959,9 +959,9 @@
                 </a:solidFill>
               </a:defRPr>
             </a:lvl7pPr>
-            <a:lvl8pPr marL="3840480" indent="0">
+            <a:lvl8pPr marL="4267093" indent="0">
               <a:buNone/>
-              <a:defRPr sz="1920">
+              <a:defRPr sz="2133">
                 <a:solidFill>
                   <a:schemeClr val="tx1">
                     <a:tint val="75000"/>
@@ -969,9 +969,9 @@
                 </a:solidFill>
               </a:defRPr>
             </a:lvl8pPr>
-            <a:lvl9pPr marL="4389120" indent="0">
+            <a:lvl9pPr marL="4876678" indent="0">
               <a:buNone/>
-              <a:defRPr sz="1920">
+              <a:defRPr sz="2133">
                 <a:solidFill>
                   <a:schemeClr val="tx1">
                     <a:tint val="75000"/>
@@ -1057,7 +1057,7 @@
     </p:spTree>
     <p:extLst>
       <p:ext uri="{BB962C8B-B14F-4D97-AF65-F5344CB8AC3E}">
-        <p14:creationId xmlns:p14="http://schemas.microsoft.com/office/powerpoint/2010/main" val="3609804516"/>
+        <p14:creationId xmlns:p14="http://schemas.microsoft.com/office/powerpoint/2010/main" val="4071821060"/>
       </p:ext>
     </p:extLst>
   </p:cSld>
@@ -1119,8 +1119,8 @@
         </p:nvSpPr>
         <p:spPr>
           <a:xfrm>
-            <a:off x="838200" y="2190750"/>
-            <a:ext cx="5181600" cy="5221606"/>
+            <a:off x="838200" y="2921000"/>
+            <a:ext cx="5181600" cy="6962141"/>
           </a:xfrm>
         </p:spPr>
         <p:txBody>
@@ -1176,8 +1176,8 @@
         </p:nvSpPr>
         <p:spPr>
           <a:xfrm>
-            <a:off x="6172200" y="2190750"/>
-            <a:ext cx="5181600" cy="5221606"/>
+            <a:off x="6172200" y="2921000"/>
+            <a:ext cx="5181600" cy="6962141"/>
           </a:xfrm>
         </p:spPr>
         <p:txBody>
@@ -1289,7 +1289,7 @@
     </p:spTree>
     <p:extLst>
       <p:ext uri="{BB962C8B-B14F-4D97-AF65-F5344CB8AC3E}">
-        <p14:creationId xmlns:p14="http://schemas.microsoft.com/office/powerpoint/2010/main" val="881224772"/>
+        <p14:creationId xmlns:p14="http://schemas.microsoft.com/office/powerpoint/2010/main" val="1878826176"/>
       </p:ext>
     </p:extLst>
   </p:cSld>
@@ -1328,8 +1328,8 @@
         </p:nvSpPr>
         <p:spPr>
           <a:xfrm>
-            <a:off x="839788" y="438152"/>
-            <a:ext cx="10515600" cy="1590676"/>
+            <a:off x="839788" y="584202"/>
+            <a:ext cx="10515600" cy="2120901"/>
           </a:xfrm>
         </p:spPr>
         <p:txBody>
@@ -1356,8 +1356,8 @@
         </p:nvSpPr>
         <p:spPr>
           <a:xfrm>
-            <a:off x="839789" y="2017396"/>
-            <a:ext cx="5157787" cy="988694"/>
+            <a:off x="839789" y="2689861"/>
+            <a:ext cx="5157787" cy="1318259"/>
           </a:xfrm>
         </p:spPr>
         <p:txBody>
@@ -1365,39 +1365,39 @@
           <a:lstStyle>
             <a:lvl1pPr marL="0" indent="0">
               <a:buNone/>
-              <a:defRPr sz="2880" b="1"/>
+              <a:defRPr sz="3200" b="1"/>
             </a:lvl1pPr>
-            <a:lvl2pPr marL="548640" indent="0">
+            <a:lvl2pPr marL="609585" indent="0">
+              <a:buNone/>
+              <a:defRPr sz="2667" b="1"/>
+            </a:lvl2pPr>
+            <a:lvl3pPr marL="1219170" indent="0">
               <a:buNone/>
               <a:defRPr sz="2400" b="1"/>
-            </a:lvl2pPr>
-            <a:lvl3pPr marL="1097280" indent="0">
+            </a:lvl3pPr>
+            <a:lvl4pPr marL="1828754" indent="0">
               <a:buNone/>
-              <a:defRPr sz="2160" b="1"/>
-            </a:lvl3pPr>
-            <a:lvl4pPr marL="1645920" indent="0">
+              <a:defRPr sz="2133" b="1"/>
+            </a:lvl4pPr>
+            <a:lvl5pPr marL="2438339" indent="0">
               <a:buNone/>
-              <a:defRPr sz="1920" b="1"/>
-            </a:lvl4pPr>
-            <a:lvl5pPr marL="2194560" indent="0">
+              <a:defRPr sz="2133" b="1"/>
+            </a:lvl5pPr>
+            <a:lvl6pPr marL="3047924" indent="0">
               <a:buNone/>
-              <a:defRPr sz="1920" b="1"/>
-            </a:lvl5pPr>
-            <a:lvl6pPr marL="2743200" indent="0">
+              <a:defRPr sz="2133" b="1"/>
+            </a:lvl6pPr>
+            <a:lvl7pPr marL="3657509" indent="0">
               <a:buNone/>
-              <a:defRPr sz="1920" b="1"/>
-            </a:lvl6pPr>
-            <a:lvl7pPr marL="3291840" indent="0">
+              <a:defRPr sz="2133" b="1"/>
+            </a:lvl7pPr>
+            <a:lvl8pPr marL="4267093" indent="0">
               <a:buNone/>
-              <a:defRPr sz="1920" b="1"/>
-            </a:lvl7pPr>
-            <a:lvl8pPr marL="3840480" indent="0">
+              <a:defRPr sz="2133" b="1"/>
+            </a:lvl8pPr>
+            <a:lvl9pPr marL="4876678" indent="0">
               <a:buNone/>
-              <a:defRPr sz="1920" b="1"/>
-            </a:lvl8pPr>
-            <a:lvl9pPr marL="4389120" indent="0">
-              <a:buNone/>
-              <a:defRPr sz="1920" b="1"/>
+              <a:defRPr sz="2133" b="1"/>
             </a:lvl9pPr>
           </a:lstStyle>
           <a:p>
@@ -1421,8 +1421,8 @@
         </p:nvSpPr>
         <p:spPr>
           <a:xfrm>
-            <a:off x="839789" y="3006090"/>
-            <a:ext cx="5157787" cy="4421506"/>
+            <a:off x="839789" y="4008120"/>
+            <a:ext cx="5157787" cy="5895341"/>
           </a:xfrm>
         </p:spPr>
         <p:txBody>
@@ -1478,8 +1478,8 @@
         </p:nvSpPr>
         <p:spPr>
           <a:xfrm>
-            <a:off x="6172201" y="2017396"/>
-            <a:ext cx="5183188" cy="988694"/>
+            <a:off x="6172201" y="2689861"/>
+            <a:ext cx="5183188" cy="1318259"/>
           </a:xfrm>
         </p:spPr>
         <p:txBody>
@@ -1487,39 +1487,39 @@
           <a:lstStyle>
             <a:lvl1pPr marL="0" indent="0">
               <a:buNone/>
-              <a:defRPr sz="2880" b="1"/>
+              <a:defRPr sz="3200" b="1"/>
             </a:lvl1pPr>
-            <a:lvl2pPr marL="548640" indent="0">
+            <a:lvl2pPr marL="609585" indent="0">
+              <a:buNone/>
+              <a:defRPr sz="2667" b="1"/>
+            </a:lvl2pPr>
+            <a:lvl3pPr marL="1219170" indent="0">
               <a:buNone/>
               <a:defRPr sz="2400" b="1"/>
-            </a:lvl2pPr>
-            <a:lvl3pPr marL="1097280" indent="0">
+            </a:lvl3pPr>
+            <a:lvl4pPr marL="1828754" indent="0">
               <a:buNone/>
-              <a:defRPr sz="2160" b="1"/>
-            </a:lvl3pPr>
-            <a:lvl4pPr marL="1645920" indent="0">
+              <a:defRPr sz="2133" b="1"/>
+            </a:lvl4pPr>
+            <a:lvl5pPr marL="2438339" indent="0">
               <a:buNone/>
-              <a:defRPr sz="1920" b="1"/>
-            </a:lvl4pPr>
-            <a:lvl5pPr marL="2194560" indent="0">
+              <a:defRPr sz="2133" b="1"/>
+            </a:lvl5pPr>
+            <a:lvl6pPr marL="3047924" indent="0">
               <a:buNone/>
-              <a:defRPr sz="1920" b="1"/>
-            </a:lvl5pPr>
-            <a:lvl6pPr marL="2743200" indent="0">
+              <a:defRPr sz="2133" b="1"/>
+            </a:lvl6pPr>
+            <a:lvl7pPr marL="3657509" indent="0">
               <a:buNone/>
-              <a:defRPr sz="1920" b="1"/>
-            </a:lvl6pPr>
-            <a:lvl7pPr marL="3291840" indent="0">
+              <a:defRPr sz="2133" b="1"/>
+            </a:lvl7pPr>
+            <a:lvl8pPr marL="4267093" indent="0">
               <a:buNone/>
-              <a:defRPr sz="1920" b="1"/>
-            </a:lvl7pPr>
-            <a:lvl8pPr marL="3840480" indent="0">
+              <a:defRPr sz="2133" b="1"/>
+            </a:lvl8pPr>
+            <a:lvl9pPr marL="4876678" indent="0">
               <a:buNone/>
-              <a:defRPr sz="1920" b="1"/>
-            </a:lvl8pPr>
-            <a:lvl9pPr marL="4389120" indent="0">
-              <a:buNone/>
-              <a:defRPr sz="1920" b="1"/>
+              <a:defRPr sz="2133" b="1"/>
             </a:lvl9pPr>
           </a:lstStyle>
           <a:p>
@@ -1543,8 +1543,8 @@
         </p:nvSpPr>
         <p:spPr>
           <a:xfrm>
-            <a:off x="6172201" y="3006090"/>
-            <a:ext cx="5183188" cy="4421506"/>
+            <a:off x="6172201" y="4008120"/>
+            <a:ext cx="5183188" cy="5895341"/>
           </a:xfrm>
         </p:spPr>
         <p:txBody>
@@ -1656,7 +1656,7 @@
     </p:spTree>
     <p:extLst>
       <p:ext uri="{BB962C8B-B14F-4D97-AF65-F5344CB8AC3E}">
-        <p14:creationId xmlns:p14="http://schemas.microsoft.com/office/powerpoint/2010/main" val="2999454167"/>
+        <p14:creationId xmlns:p14="http://schemas.microsoft.com/office/powerpoint/2010/main" val="3520705910"/>
       </p:ext>
     </p:extLst>
   </p:cSld>
@@ -1774,7 +1774,7 @@
     </p:spTree>
     <p:extLst>
       <p:ext uri="{BB962C8B-B14F-4D97-AF65-F5344CB8AC3E}">
-        <p14:creationId xmlns:p14="http://schemas.microsoft.com/office/powerpoint/2010/main" val="1982580305"/>
+        <p14:creationId xmlns:p14="http://schemas.microsoft.com/office/powerpoint/2010/main" val="3105782641"/>
       </p:ext>
     </p:extLst>
   </p:cSld>
@@ -1869,7 +1869,7 @@
     </p:spTree>
     <p:extLst>
       <p:ext uri="{BB962C8B-B14F-4D97-AF65-F5344CB8AC3E}">
-        <p14:creationId xmlns:p14="http://schemas.microsoft.com/office/powerpoint/2010/main" val="1303500890"/>
+        <p14:creationId xmlns:p14="http://schemas.microsoft.com/office/powerpoint/2010/main" val="1166112166"/>
       </p:ext>
     </p:extLst>
   </p:cSld>
@@ -1908,15 +1908,15 @@
         </p:nvSpPr>
         <p:spPr>
           <a:xfrm>
-            <a:off x="839788" y="548640"/>
-            <a:ext cx="3932237" cy="1920240"/>
+            <a:off x="839788" y="731520"/>
+            <a:ext cx="3932237" cy="2560320"/>
           </a:xfrm>
         </p:spPr>
         <p:txBody>
           <a:bodyPr anchor="b"/>
           <a:lstStyle>
             <a:lvl1pPr>
-              <a:defRPr sz="3840"/>
+              <a:defRPr sz="4267"/>
             </a:lvl1pPr>
           </a:lstStyle>
           <a:p>
@@ -1940,39 +1940,39 @@
         </p:nvSpPr>
         <p:spPr>
           <a:xfrm>
-            <a:off x="5183188" y="1184912"/>
-            <a:ext cx="6172200" cy="5848350"/>
+            <a:off x="5183188" y="1579882"/>
+            <a:ext cx="6172200" cy="7797800"/>
           </a:xfrm>
         </p:spPr>
         <p:txBody>
           <a:bodyPr/>
           <a:lstStyle>
             <a:lvl1pPr>
-              <a:defRPr sz="3840"/>
+              <a:defRPr sz="4267"/>
             </a:lvl1pPr>
             <a:lvl2pPr>
-              <a:defRPr sz="3360"/>
+              <a:defRPr sz="3733"/>
             </a:lvl2pPr>
             <a:lvl3pPr>
-              <a:defRPr sz="2880"/>
+              <a:defRPr sz="3200"/>
             </a:lvl3pPr>
             <a:lvl4pPr>
-              <a:defRPr sz="2400"/>
+              <a:defRPr sz="2667"/>
             </a:lvl4pPr>
             <a:lvl5pPr>
-              <a:defRPr sz="2400"/>
+              <a:defRPr sz="2667"/>
             </a:lvl5pPr>
             <a:lvl6pPr>
-              <a:defRPr sz="2400"/>
+              <a:defRPr sz="2667"/>
             </a:lvl6pPr>
             <a:lvl7pPr>
-              <a:defRPr sz="2400"/>
+              <a:defRPr sz="2667"/>
             </a:lvl7pPr>
             <a:lvl8pPr>
-              <a:defRPr sz="2400"/>
+              <a:defRPr sz="2667"/>
             </a:lvl8pPr>
             <a:lvl9pPr>
-              <a:defRPr sz="2400"/>
+              <a:defRPr sz="2667"/>
             </a:lvl9pPr>
           </a:lstStyle>
           <a:p>
@@ -2025,8 +2025,8 @@
         </p:nvSpPr>
         <p:spPr>
           <a:xfrm>
-            <a:off x="839788" y="2468880"/>
-            <a:ext cx="3932237" cy="4573906"/>
+            <a:off x="839788" y="3291840"/>
+            <a:ext cx="3932237" cy="6098541"/>
           </a:xfrm>
         </p:spPr>
         <p:txBody>
@@ -2034,39 +2034,39 @@
           <a:lstStyle>
             <a:lvl1pPr marL="0" indent="0">
               <a:buNone/>
-              <a:defRPr sz="1920"/>
+              <a:defRPr sz="2133"/>
             </a:lvl1pPr>
-            <a:lvl2pPr marL="548640" indent="0">
+            <a:lvl2pPr marL="609585" indent="0">
               <a:buNone/>
-              <a:defRPr sz="1680"/>
+              <a:defRPr sz="1867"/>
             </a:lvl2pPr>
-            <a:lvl3pPr marL="1097280" indent="0">
+            <a:lvl3pPr marL="1219170" indent="0">
               <a:buNone/>
-              <a:defRPr sz="1440"/>
+              <a:defRPr sz="1600"/>
             </a:lvl3pPr>
-            <a:lvl4pPr marL="1645920" indent="0">
+            <a:lvl4pPr marL="1828754" indent="0">
               <a:buNone/>
-              <a:defRPr sz="1200"/>
+              <a:defRPr sz="1333"/>
             </a:lvl4pPr>
-            <a:lvl5pPr marL="2194560" indent="0">
+            <a:lvl5pPr marL="2438339" indent="0">
               <a:buNone/>
-              <a:defRPr sz="1200"/>
+              <a:defRPr sz="1333"/>
             </a:lvl5pPr>
-            <a:lvl6pPr marL="2743200" indent="0">
+            <a:lvl6pPr marL="3047924" indent="0">
               <a:buNone/>
-              <a:defRPr sz="1200"/>
+              <a:defRPr sz="1333"/>
             </a:lvl6pPr>
-            <a:lvl7pPr marL="3291840" indent="0">
+            <a:lvl7pPr marL="3657509" indent="0">
               <a:buNone/>
-              <a:defRPr sz="1200"/>
+              <a:defRPr sz="1333"/>
             </a:lvl7pPr>
-            <a:lvl8pPr marL="3840480" indent="0">
+            <a:lvl8pPr marL="4267093" indent="0">
               <a:buNone/>
-              <a:defRPr sz="1200"/>
+              <a:defRPr sz="1333"/>
             </a:lvl8pPr>
-            <a:lvl9pPr marL="4389120" indent="0">
+            <a:lvl9pPr marL="4876678" indent="0">
               <a:buNone/>
-              <a:defRPr sz="1200"/>
+              <a:defRPr sz="1333"/>
             </a:lvl9pPr>
           </a:lstStyle>
           <a:p>
@@ -2146,7 +2146,7 @@
     </p:spTree>
     <p:extLst>
       <p:ext uri="{BB962C8B-B14F-4D97-AF65-F5344CB8AC3E}">
-        <p14:creationId xmlns:p14="http://schemas.microsoft.com/office/powerpoint/2010/main" val="3757255095"/>
+        <p14:creationId xmlns:p14="http://schemas.microsoft.com/office/powerpoint/2010/main" val="2765392227"/>
       </p:ext>
     </p:extLst>
   </p:cSld>
@@ -2185,15 +2185,15 @@
         </p:nvSpPr>
         <p:spPr>
           <a:xfrm>
-            <a:off x="839788" y="548640"/>
-            <a:ext cx="3932237" cy="1920240"/>
+            <a:off x="839788" y="731520"/>
+            <a:ext cx="3932237" cy="2560320"/>
           </a:xfrm>
         </p:spPr>
         <p:txBody>
           <a:bodyPr anchor="b"/>
           <a:lstStyle>
             <a:lvl1pPr>
-              <a:defRPr sz="3840"/>
+              <a:defRPr sz="4267"/>
             </a:lvl1pPr>
           </a:lstStyle>
           <a:p>
@@ -2217,8 +2217,8 @@
         </p:nvSpPr>
         <p:spPr>
           <a:xfrm>
-            <a:off x="5183188" y="1184912"/>
-            <a:ext cx="6172200" cy="5848350"/>
+            <a:off x="5183188" y="1579882"/>
+            <a:ext cx="6172200" cy="7797800"/>
           </a:xfrm>
         </p:spPr>
         <p:txBody>
@@ -2226,39 +2226,39 @@
           <a:lstStyle>
             <a:lvl1pPr marL="0" indent="0">
               <a:buNone/>
-              <a:defRPr sz="3840"/>
+              <a:defRPr sz="4267"/>
             </a:lvl1pPr>
-            <a:lvl2pPr marL="548640" indent="0">
+            <a:lvl2pPr marL="609585" indent="0">
               <a:buNone/>
-              <a:defRPr sz="3360"/>
+              <a:defRPr sz="3733"/>
             </a:lvl2pPr>
-            <a:lvl3pPr marL="1097280" indent="0">
+            <a:lvl3pPr marL="1219170" indent="0">
               <a:buNone/>
-              <a:defRPr sz="2880"/>
+              <a:defRPr sz="3200"/>
             </a:lvl3pPr>
-            <a:lvl4pPr marL="1645920" indent="0">
+            <a:lvl4pPr marL="1828754" indent="0">
               <a:buNone/>
-              <a:defRPr sz="2400"/>
+              <a:defRPr sz="2667"/>
             </a:lvl4pPr>
-            <a:lvl5pPr marL="2194560" indent="0">
+            <a:lvl5pPr marL="2438339" indent="0">
               <a:buNone/>
-              <a:defRPr sz="2400"/>
+              <a:defRPr sz="2667"/>
             </a:lvl5pPr>
-            <a:lvl6pPr marL="2743200" indent="0">
+            <a:lvl6pPr marL="3047924" indent="0">
               <a:buNone/>
-              <a:defRPr sz="2400"/>
+              <a:defRPr sz="2667"/>
             </a:lvl6pPr>
-            <a:lvl7pPr marL="3291840" indent="0">
+            <a:lvl7pPr marL="3657509" indent="0">
               <a:buNone/>
-              <a:defRPr sz="2400"/>
+              <a:defRPr sz="2667"/>
             </a:lvl7pPr>
-            <a:lvl8pPr marL="3840480" indent="0">
+            <a:lvl8pPr marL="4267093" indent="0">
               <a:buNone/>
-              <a:defRPr sz="2400"/>
+              <a:defRPr sz="2667"/>
             </a:lvl8pPr>
-            <a:lvl9pPr marL="4389120" indent="0">
+            <a:lvl9pPr marL="4876678" indent="0">
               <a:buNone/>
-              <a:defRPr sz="2400"/>
+              <a:defRPr sz="2667"/>
             </a:lvl9pPr>
           </a:lstStyle>
           <a:p>
@@ -2282,8 +2282,8 @@
         </p:nvSpPr>
         <p:spPr>
           <a:xfrm>
-            <a:off x="839788" y="2468880"/>
-            <a:ext cx="3932237" cy="4573906"/>
+            <a:off x="839788" y="3291840"/>
+            <a:ext cx="3932237" cy="6098541"/>
           </a:xfrm>
         </p:spPr>
         <p:txBody>
@@ -2291,39 +2291,39 @@
           <a:lstStyle>
             <a:lvl1pPr marL="0" indent="0">
               <a:buNone/>
-              <a:defRPr sz="1920"/>
+              <a:defRPr sz="2133"/>
             </a:lvl1pPr>
-            <a:lvl2pPr marL="548640" indent="0">
+            <a:lvl2pPr marL="609585" indent="0">
               <a:buNone/>
-              <a:defRPr sz="1680"/>
+              <a:defRPr sz="1867"/>
             </a:lvl2pPr>
-            <a:lvl3pPr marL="1097280" indent="0">
+            <a:lvl3pPr marL="1219170" indent="0">
               <a:buNone/>
-              <a:defRPr sz="1440"/>
+              <a:defRPr sz="1600"/>
             </a:lvl3pPr>
-            <a:lvl4pPr marL="1645920" indent="0">
+            <a:lvl4pPr marL="1828754" indent="0">
               <a:buNone/>
-              <a:defRPr sz="1200"/>
+              <a:defRPr sz="1333"/>
             </a:lvl4pPr>
-            <a:lvl5pPr marL="2194560" indent="0">
+            <a:lvl5pPr marL="2438339" indent="0">
               <a:buNone/>
-              <a:defRPr sz="1200"/>
+              <a:defRPr sz="1333"/>
             </a:lvl5pPr>
-            <a:lvl6pPr marL="2743200" indent="0">
+            <a:lvl6pPr marL="3047924" indent="0">
               <a:buNone/>
-              <a:defRPr sz="1200"/>
+              <a:defRPr sz="1333"/>
             </a:lvl6pPr>
-            <a:lvl7pPr marL="3291840" indent="0">
+            <a:lvl7pPr marL="3657509" indent="0">
               <a:buNone/>
-              <a:defRPr sz="1200"/>
+              <a:defRPr sz="1333"/>
             </a:lvl7pPr>
-            <a:lvl8pPr marL="3840480" indent="0">
+            <a:lvl8pPr marL="4267093" indent="0">
               <a:buNone/>
-              <a:defRPr sz="1200"/>
+              <a:defRPr sz="1333"/>
             </a:lvl8pPr>
-            <a:lvl9pPr marL="4389120" indent="0">
+            <a:lvl9pPr marL="4876678" indent="0">
               <a:buNone/>
-              <a:defRPr sz="1200"/>
+              <a:defRPr sz="1333"/>
             </a:lvl9pPr>
           </a:lstStyle>
           <a:p>
@@ -2403,7 +2403,7 @@
     </p:spTree>
     <p:extLst>
       <p:ext uri="{BB962C8B-B14F-4D97-AF65-F5344CB8AC3E}">
-        <p14:creationId xmlns:p14="http://schemas.microsoft.com/office/powerpoint/2010/main" val="1360161559"/>
+        <p14:creationId xmlns:p14="http://schemas.microsoft.com/office/powerpoint/2010/main" val="4153174276"/>
       </p:ext>
     </p:extLst>
   </p:cSld>
@@ -2447,8 +2447,8 @@
         </p:nvSpPr>
         <p:spPr>
           <a:xfrm>
-            <a:off x="838200" y="438152"/>
-            <a:ext cx="10515600" cy="1590676"/>
+            <a:off x="838200" y="584202"/>
+            <a:ext cx="10515600" cy="2120901"/>
           </a:xfrm>
           <a:prstGeom prst="rect">
             <a:avLst/>
@@ -2480,8 +2480,8 @@
         </p:nvSpPr>
         <p:spPr>
           <a:xfrm>
-            <a:off x="838200" y="2190750"/>
-            <a:ext cx="10515600" cy="5221606"/>
+            <a:off x="838200" y="2921000"/>
+            <a:ext cx="10515600" cy="6962141"/>
           </a:xfrm>
           <a:prstGeom prst="rect">
             <a:avLst/>
@@ -2542,8 +2542,8 @@
         </p:nvSpPr>
         <p:spPr>
           <a:xfrm>
-            <a:off x="838200" y="7627622"/>
-            <a:ext cx="2743200" cy="438150"/>
+            <a:off x="838200" y="10170162"/>
+            <a:ext cx="2743200" cy="584200"/>
           </a:xfrm>
           <a:prstGeom prst="rect">
             <a:avLst/>
@@ -2553,7 +2553,7 @@
           <a:bodyPr vert="horz" lIns="91440" tIns="45720" rIns="91440" bIns="45720" rtlCol="0" anchor="ctr"/>
           <a:lstStyle>
             <a:lvl1pPr algn="l">
-              <a:defRPr sz="1440">
+              <a:defRPr sz="1600">
                 <a:solidFill>
                   <a:schemeClr val="tx1">
                     <a:tint val="75000"/>
@@ -2583,8 +2583,8 @@
         </p:nvSpPr>
         <p:spPr>
           <a:xfrm>
-            <a:off x="4038600" y="7627622"/>
-            <a:ext cx="4114800" cy="438150"/>
+            <a:off x="4038600" y="10170162"/>
+            <a:ext cx="4114800" cy="584200"/>
           </a:xfrm>
           <a:prstGeom prst="rect">
             <a:avLst/>
@@ -2594,7 +2594,7 @@
           <a:bodyPr vert="horz" lIns="91440" tIns="45720" rIns="91440" bIns="45720" rtlCol="0" anchor="ctr"/>
           <a:lstStyle>
             <a:lvl1pPr algn="ctr">
-              <a:defRPr sz="1440">
+              <a:defRPr sz="1600">
                 <a:solidFill>
                   <a:schemeClr val="tx1">
                     <a:tint val="75000"/>
@@ -2620,8 +2620,8 @@
         </p:nvSpPr>
         <p:spPr>
           <a:xfrm>
-            <a:off x="8610600" y="7627622"/>
-            <a:ext cx="2743200" cy="438150"/>
+            <a:off x="8610600" y="10170162"/>
+            <a:ext cx="2743200" cy="584200"/>
           </a:xfrm>
           <a:prstGeom prst="rect">
             <a:avLst/>
@@ -2631,7 +2631,7 @@
           <a:bodyPr vert="horz" lIns="91440" tIns="45720" rIns="91440" bIns="45720" rtlCol="0" anchor="ctr"/>
           <a:lstStyle>
             <a:lvl1pPr algn="r">
-              <a:defRPr sz="1440">
+              <a:defRPr sz="1600">
                 <a:solidFill>
                   <a:schemeClr val="tx1">
                     <a:tint val="75000"/>
@@ -2652,27 +2652,27 @@
     </p:spTree>
     <p:extLst>
       <p:ext uri="{BB962C8B-B14F-4D97-AF65-F5344CB8AC3E}">
-        <p14:creationId xmlns:p14="http://schemas.microsoft.com/office/powerpoint/2010/main" val="3933735673"/>
+        <p14:creationId xmlns:p14="http://schemas.microsoft.com/office/powerpoint/2010/main" val="1052680776"/>
       </p:ext>
     </p:extLst>
   </p:cSld>
   <p:clrMap bg1="lt1" tx1="dk1" bg2="lt2" tx2="dk2" accent1="accent1" accent2="accent2" accent3="accent3" accent4="accent4" accent5="accent5" accent6="accent6" hlink="hlink" folHlink="folHlink"/>
   <p:sldLayoutIdLst>
-    <p:sldLayoutId id="2147483661" r:id="rId1"/>
-    <p:sldLayoutId id="2147483662" r:id="rId2"/>
-    <p:sldLayoutId id="2147483663" r:id="rId3"/>
-    <p:sldLayoutId id="2147483664" r:id="rId4"/>
-    <p:sldLayoutId id="2147483665" r:id="rId5"/>
-    <p:sldLayoutId id="2147483666" r:id="rId6"/>
-    <p:sldLayoutId id="2147483667" r:id="rId7"/>
-    <p:sldLayoutId id="2147483668" r:id="rId8"/>
-    <p:sldLayoutId id="2147483669" r:id="rId9"/>
-    <p:sldLayoutId id="2147483670" r:id="rId10"/>
-    <p:sldLayoutId id="2147483671" r:id="rId11"/>
+    <p:sldLayoutId id="2147483673" r:id="rId1"/>
+    <p:sldLayoutId id="2147483674" r:id="rId2"/>
+    <p:sldLayoutId id="2147483675" r:id="rId3"/>
+    <p:sldLayoutId id="2147483676" r:id="rId4"/>
+    <p:sldLayoutId id="2147483677" r:id="rId5"/>
+    <p:sldLayoutId id="2147483678" r:id="rId6"/>
+    <p:sldLayoutId id="2147483679" r:id="rId7"/>
+    <p:sldLayoutId id="2147483680" r:id="rId8"/>
+    <p:sldLayoutId id="2147483681" r:id="rId9"/>
+    <p:sldLayoutId id="2147483682" r:id="rId10"/>
+    <p:sldLayoutId id="2147483683" r:id="rId11"/>
   </p:sldLayoutIdLst>
   <p:txStyles>
     <p:titleStyle>
-      <a:lvl1pPr algn="l" defTabSz="1097280" rtl="0" eaLnBrk="1" latinLnBrk="0" hangingPunct="1">
+      <a:lvl1pPr algn="l" defTabSz="1219170" rtl="0" eaLnBrk="1" latinLnBrk="0" hangingPunct="1">
         <a:lnSpc>
           <a:spcPct val="90000"/>
         </a:lnSpc>
@@ -2680,7 +2680,7 @@
           <a:spcPct val="0"/>
         </a:spcBef>
         <a:buNone/>
-        <a:defRPr sz="5280" kern="1200">
+        <a:defRPr sz="5867" kern="1200">
           <a:solidFill>
             <a:schemeClr val="tx1"/>
           </a:solidFill>
@@ -2691,16 +2691,16 @@
       </a:lvl1pPr>
     </p:titleStyle>
     <p:bodyStyle>
-      <a:lvl1pPr marL="274320" indent="-274320" algn="l" defTabSz="1097280" rtl="0" eaLnBrk="1" latinLnBrk="0" hangingPunct="1">
+      <a:lvl1pPr marL="304792" indent="-304792" algn="l" defTabSz="1219170" rtl="0" eaLnBrk="1" latinLnBrk="0" hangingPunct="1">
         <a:lnSpc>
           <a:spcPct val="90000"/>
         </a:lnSpc>
         <a:spcBef>
-          <a:spcPts val="1200"/>
+          <a:spcPts val="1333"/>
         </a:spcBef>
         <a:buFont typeface="Arial" panose="020B0604020202020204" pitchFamily="34" charset="0"/>
         <a:buChar char="•"/>
-        <a:defRPr sz="3360" kern="1200">
+        <a:defRPr sz="3733" kern="1200">
           <a:solidFill>
             <a:schemeClr val="tx1"/>
           </a:solidFill>
@@ -2709,16 +2709,16 @@
           <a:cs typeface="+mn-cs"/>
         </a:defRPr>
       </a:lvl1pPr>
-      <a:lvl2pPr marL="822960" indent="-274320" algn="l" defTabSz="1097280" rtl="0" eaLnBrk="1" latinLnBrk="0" hangingPunct="1">
+      <a:lvl2pPr marL="914377" indent="-304792" algn="l" defTabSz="1219170" rtl="0" eaLnBrk="1" latinLnBrk="0" hangingPunct="1">
         <a:lnSpc>
           <a:spcPct val="90000"/>
         </a:lnSpc>
         <a:spcBef>
-          <a:spcPts val="600"/>
+          <a:spcPts val="667"/>
         </a:spcBef>
         <a:buFont typeface="Arial" panose="020B0604020202020204" pitchFamily="34" charset="0"/>
         <a:buChar char="•"/>
-        <a:defRPr sz="2880" kern="1200">
+        <a:defRPr sz="3200" kern="1200">
           <a:solidFill>
             <a:schemeClr val="tx1"/>
           </a:solidFill>
@@ -2727,12 +2727,30 @@
           <a:cs typeface="+mn-cs"/>
         </a:defRPr>
       </a:lvl2pPr>
-      <a:lvl3pPr marL="1371600" indent="-274320" algn="l" defTabSz="1097280" rtl="0" eaLnBrk="1" latinLnBrk="0" hangingPunct="1">
+      <a:lvl3pPr marL="1523962" indent="-304792" algn="l" defTabSz="1219170" rtl="0" eaLnBrk="1" latinLnBrk="0" hangingPunct="1">
         <a:lnSpc>
           <a:spcPct val="90000"/>
         </a:lnSpc>
         <a:spcBef>
-          <a:spcPts val="600"/>
+          <a:spcPts val="667"/>
+        </a:spcBef>
+        <a:buFont typeface="Arial" panose="020B0604020202020204" pitchFamily="34" charset="0"/>
+        <a:buChar char="•"/>
+        <a:defRPr sz="2667" kern="1200">
+          <a:solidFill>
+            <a:schemeClr val="tx1"/>
+          </a:solidFill>
+          <a:latin typeface="+mn-lt"/>
+          <a:ea typeface="+mn-ea"/>
+          <a:cs typeface="+mn-cs"/>
+        </a:defRPr>
+      </a:lvl3pPr>
+      <a:lvl4pPr marL="2133547" indent="-304792" algn="l" defTabSz="1219170" rtl="0" eaLnBrk="1" latinLnBrk="0" hangingPunct="1">
+        <a:lnSpc>
+          <a:spcPct val="90000"/>
+        </a:lnSpc>
+        <a:spcBef>
+          <a:spcPts val="667"/>
         </a:spcBef>
         <a:buFont typeface="Arial" panose="020B0604020202020204" pitchFamily="34" charset="0"/>
         <a:buChar char="•"/>
@@ -2744,35 +2762,17 @@
           <a:ea typeface="+mn-ea"/>
           <a:cs typeface="+mn-cs"/>
         </a:defRPr>
-      </a:lvl3pPr>
-      <a:lvl4pPr marL="1920240" indent="-274320" algn="l" defTabSz="1097280" rtl="0" eaLnBrk="1" latinLnBrk="0" hangingPunct="1">
+      </a:lvl4pPr>
+      <a:lvl5pPr marL="2743131" indent="-304792" algn="l" defTabSz="1219170" rtl="0" eaLnBrk="1" latinLnBrk="0" hangingPunct="1">
         <a:lnSpc>
           <a:spcPct val="90000"/>
         </a:lnSpc>
         <a:spcBef>
-          <a:spcPts val="600"/>
+          <a:spcPts val="667"/>
         </a:spcBef>
         <a:buFont typeface="Arial" panose="020B0604020202020204" pitchFamily="34" charset="0"/>
         <a:buChar char="•"/>
-        <a:defRPr sz="2160" kern="1200">
-          <a:solidFill>
-            <a:schemeClr val="tx1"/>
-          </a:solidFill>
-          <a:latin typeface="+mn-lt"/>
-          <a:ea typeface="+mn-ea"/>
-          <a:cs typeface="+mn-cs"/>
-        </a:defRPr>
-      </a:lvl4pPr>
-      <a:lvl5pPr marL="2468880" indent="-274320" algn="l" defTabSz="1097280" rtl="0" eaLnBrk="1" latinLnBrk="0" hangingPunct="1">
-        <a:lnSpc>
-          <a:spcPct val="90000"/>
-        </a:lnSpc>
-        <a:spcBef>
-          <a:spcPts val="600"/>
-        </a:spcBef>
-        <a:buFont typeface="Arial" panose="020B0604020202020204" pitchFamily="34" charset="0"/>
-        <a:buChar char="•"/>
-        <a:defRPr sz="2160" kern="1200">
+        <a:defRPr sz="2400" kern="1200">
           <a:solidFill>
             <a:schemeClr val="tx1"/>
           </a:solidFill>
@@ -2781,16 +2781,16 @@
           <a:cs typeface="+mn-cs"/>
         </a:defRPr>
       </a:lvl5pPr>
-      <a:lvl6pPr marL="3017520" indent="-274320" algn="l" defTabSz="1097280" rtl="0" eaLnBrk="1" latinLnBrk="0" hangingPunct="1">
+      <a:lvl6pPr marL="3352716" indent="-304792" algn="l" defTabSz="1219170" rtl="0" eaLnBrk="1" latinLnBrk="0" hangingPunct="1">
         <a:lnSpc>
           <a:spcPct val="90000"/>
         </a:lnSpc>
         <a:spcBef>
-          <a:spcPts val="600"/>
+          <a:spcPts val="667"/>
         </a:spcBef>
         <a:buFont typeface="Arial" panose="020B0604020202020204" pitchFamily="34" charset="0"/>
         <a:buChar char="•"/>
-        <a:defRPr sz="2160" kern="1200">
+        <a:defRPr sz="2400" kern="1200">
           <a:solidFill>
             <a:schemeClr val="tx1"/>
           </a:solidFill>
@@ -2799,16 +2799,16 @@
           <a:cs typeface="+mn-cs"/>
         </a:defRPr>
       </a:lvl6pPr>
-      <a:lvl7pPr marL="3566160" indent="-274320" algn="l" defTabSz="1097280" rtl="0" eaLnBrk="1" latinLnBrk="0" hangingPunct="1">
+      <a:lvl7pPr marL="3962301" indent="-304792" algn="l" defTabSz="1219170" rtl="0" eaLnBrk="1" latinLnBrk="0" hangingPunct="1">
         <a:lnSpc>
           <a:spcPct val="90000"/>
         </a:lnSpc>
         <a:spcBef>
-          <a:spcPts val="600"/>
+          <a:spcPts val="667"/>
         </a:spcBef>
         <a:buFont typeface="Arial" panose="020B0604020202020204" pitchFamily="34" charset="0"/>
         <a:buChar char="•"/>
-        <a:defRPr sz="2160" kern="1200">
+        <a:defRPr sz="2400" kern="1200">
           <a:solidFill>
             <a:schemeClr val="tx1"/>
           </a:solidFill>
@@ -2817,16 +2817,16 @@
           <a:cs typeface="+mn-cs"/>
         </a:defRPr>
       </a:lvl7pPr>
-      <a:lvl8pPr marL="4114800" indent="-274320" algn="l" defTabSz="1097280" rtl="0" eaLnBrk="1" latinLnBrk="0" hangingPunct="1">
+      <a:lvl8pPr marL="4571886" indent="-304792" algn="l" defTabSz="1219170" rtl="0" eaLnBrk="1" latinLnBrk="0" hangingPunct="1">
         <a:lnSpc>
           <a:spcPct val="90000"/>
         </a:lnSpc>
         <a:spcBef>
-          <a:spcPts val="600"/>
+          <a:spcPts val="667"/>
         </a:spcBef>
         <a:buFont typeface="Arial" panose="020B0604020202020204" pitchFamily="34" charset="0"/>
         <a:buChar char="•"/>
-        <a:defRPr sz="2160" kern="1200">
+        <a:defRPr sz="2400" kern="1200">
           <a:solidFill>
             <a:schemeClr val="tx1"/>
           </a:solidFill>
@@ -2835,16 +2835,16 @@
           <a:cs typeface="+mn-cs"/>
         </a:defRPr>
       </a:lvl8pPr>
-      <a:lvl9pPr marL="4663440" indent="-274320" algn="l" defTabSz="1097280" rtl="0" eaLnBrk="1" latinLnBrk="0" hangingPunct="1">
+      <a:lvl9pPr marL="5181470" indent="-304792" algn="l" defTabSz="1219170" rtl="0" eaLnBrk="1" latinLnBrk="0" hangingPunct="1">
         <a:lnSpc>
           <a:spcPct val="90000"/>
         </a:lnSpc>
         <a:spcBef>
-          <a:spcPts val="600"/>
+          <a:spcPts val="667"/>
         </a:spcBef>
         <a:buFont typeface="Arial" panose="020B0604020202020204" pitchFamily="34" charset="0"/>
         <a:buChar char="•"/>
-        <a:defRPr sz="2160" kern="1200">
+        <a:defRPr sz="2400" kern="1200">
           <a:solidFill>
             <a:schemeClr val="tx1"/>
           </a:solidFill>
@@ -2858,8 +2858,8 @@
       <a:defPPr>
         <a:defRPr lang="en-US"/>
       </a:defPPr>
-      <a:lvl1pPr marL="0" algn="l" defTabSz="1097280" rtl="0" eaLnBrk="1" latinLnBrk="0" hangingPunct="1">
-        <a:defRPr sz="2160" kern="1200">
+      <a:lvl1pPr marL="0" algn="l" defTabSz="1219170" rtl="0" eaLnBrk="1" latinLnBrk="0" hangingPunct="1">
+        <a:defRPr sz="2400" kern="1200">
           <a:solidFill>
             <a:schemeClr val="tx1"/>
           </a:solidFill>
@@ -2868,8 +2868,8 @@
           <a:cs typeface="+mn-cs"/>
         </a:defRPr>
       </a:lvl1pPr>
-      <a:lvl2pPr marL="548640" algn="l" defTabSz="1097280" rtl="0" eaLnBrk="1" latinLnBrk="0" hangingPunct="1">
-        <a:defRPr sz="2160" kern="1200">
+      <a:lvl2pPr marL="609585" algn="l" defTabSz="1219170" rtl="0" eaLnBrk="1" latinLnBrk="0" hangingPunct="1">
+        <a:defRPr sz="2400" kern="1200">
           <a:solidFill>
             <a:schemeClr val="tx1"/>
           </a:solidFill>
@@ -2878,8 +2878,8 @@
           <a:cs typeface="+mn-cs"/>
         </a:defRPr>
       </a:lvl2pPr>
-      <a:lvl3pPr marL="1097280" algn="l" defTabSz="1097280" rtl="0" eaLnBrk="1" latinLnBrk="0" hangingPunct="1">
-        <a:defRPr sz="2160" kern="1200">
+      <a:lvl3pPr marL="1219170" algn="l" defTabSz="1219170" rtl="0" eaLnBrk="1" latinLnBrk="0" hangingPunct="1">
+        <a:defRPr sz="2400" kern="1200">
           <a:solidFill>
             <a:schemeClr val="tx1"/>
           </a:solidFill>
@@ -2888,8 +2888,8 @@
           <a:cs typeface="+mn-cs"/>
         </a:defRPr>
       </a:lvl3pPr>
-      <a:lvl4pPr marL="1645920" algn="l" defTabSz="1097280" rtl="0" eaLnBrk="1" latinLnBrk="0" hangingPunct="1">
-        <a:defRPr sz="2160" kern="1200">
+      <a:lvl4pPr marL="1828754" algn="l" defTabSz="1219170" rtl="0" eaLnBrk="1" latinLnBrk="0" hangingPunct="1">
+        <a:defRPr sz="2400" kern="1200">
           <a:solidFill>
             <a:schemeClr val="tx1"/>
           </a:solidFill>
@@ -2898,8 +2898,8 @@
           <a:cs typeface="+mn-cs"/>
         </a:defRPr>
       </a:lvl4pPr>
-      <a:lvl5pPr marL="2194560" algn="l" defTabSz="1097280" rtl="0" eaLnBrk="1" latinLnBrk="0" hangingPunct="1">
-        <a:defRPr sz="2160" kern="1200">
+      <a:lvl5pPr marL="2438339" algn="l" defTabSz="1219170" rtl="0" eaLnBrk="1" latinLnBrk="0" hangingPunct="1">
+        <a:defRPr sz="2400" kern="1200">
           <a:solidFill>
             <a:schemeClr val="tx1"/>
           </a:solidFill>
@@ -2908,8 +2908,8 @@
           <a:cs typeface="+mn-cs"/>
         </a:defRPr>
       </a:lvl5pPr>
-      <a:lvl6pPr marL="2743200" algn="l" defTabSz="1097280" rtl="0" eaLnBrk="1" latinLnBrk="0" hangingPunct="1">
-        <a:defRPr sz="2160" kern="1200">
+      <a:lvl6pPr marL="3047924" algn="l" defTabSz="1219170" rtl="0" eaLnBrk="1" latinLnBrk="0" hangingPunct="1">
+        <a:defRPr sz="2400" kern="1200">
           <a:solidFill>
             <a:schemeClr val="tx1"/>
           </a:solidFill>
@@ -2918,8 +2918,8 @@
           <a:cs typeface="+mn-cs"/>
         </a:defRPr>
       </a:lvl6pPr>
-      <a:lvl7pPr marL="3291840" algn="l" defTabSz="1097280" rtl="0" eaLnBrk="1" latinLnBrk="0" hangingPunct="1">
-        <a:defRPr sz="2160" kern="1200">
+      <a:lvl7pPr marL="3657509" algn="l" defTabSz="1219170" rtl="0" eaLnBrk="1" latinLnBrk="0" hangingPunct="1">
+        <a:defRPr sz="2400" kern="1200">
           <a:solidFill>
             <a:schemeClr val="tx1"/>
           </a:solidFill>
@@ -2928,8 +2928,8 @@
           <a:cs typeface="+mn-cs"/>
         </a:defRPr>
       </a:lvl7pPr>
-      <a:lvl8pPr marL="3840480" algn="l" defTabSz="1097280" rtl="0" eaLnBrk="1" latinLnBrk="0" hangingPunct="1">
-        <a:defRPr sz="2160" kern="1200">
+      <a:lvl8pPr marL="4267093" algn="l" defTabSz="1219170" rtl="0" eaLnBrk="1" latinLnBrk="0" hangingPunct="1">
+        <a:defRPr sz="2400" kern="1200">
           <a:solidFill>
             <a:schemeClr val="tx1"/>
           </a:solidFill>
@@ -2938,8 +2938,8 @@
           <a:cs typeface="+mn-cs"/>
         </a:defRPr>
       </a:lvl8pPr>
-      <a:lvl9pPr marL="4389120" algn="l" defTabSz="1097280" rtl="0" eaLnBrk="1" latinLnBrk="0" hangingPunct="1">
-        <a:defRPr sz="2160" kern="1200">
+      <a:lvl9pPr marL="4876678" algn="l" defTabSz="1219170" rtl="0" eaLnBrk="1" latinLnBrk="0" hangingPunct="1">
+        <a:defRPr sz="2400" kern="1200">
           <a:solidFill>
             <a:schemeClr val="tx1"/>
           </a:solidFill>
@@ -2984,7 +2984,7 @@
         </p:nvSpPr>
         <p:spPr>
           <a:xfrm>
-            <a:off x="625034" y="764013"/>
+            <a:off x="625034" y="847992"/>
             <a:ext cx="1875098" cy="801063"/>
           </a:xfrm>
           <a:prstGeom prst="rect">
@@ -3045,7 +3045,7 @@
         </p:nvSpPr>
         <p:spPr>
           <a:xfrm>
-            <a:off x="2953474" y="764013"/>
+            <a:off x="2953474" y="847992"/>
             <a:ext cx="1875098" cy="801063"/>
           </a:xfrm>
           <a:prstGeom prst="rect">
@@ -3087,7 +3087,7 @@
             <a:pPr algn="ctr"/>
             <a:r>
               <a:rPr lang="en-US" sz="1400" dirty="0"/>
-              <a:t>X variables</a:t>
+              <a:t>23  claim types</a:t>
             </a:r>
           </a:p>
         </p:txBody>
@@ -3106,7 +3106,7 @@
         </p:nvSpPr>
         <p:spPr>
           <a:xfrm>
-            <a:off x="625034" y="83037"/>
+            <a:off x="625034" y="167016"/>
             <a:ext cx="4203538" cy="495781"/>
           </a:xfrm>
           <a:prstGeom prst="rect">
@@ -3176,7 +3176,7 @@
         </p:nvSpPr>
         <p:spPr>
           <a:xfrm>
-            <a:off x="625034" y="1726648"/>
+            <a:off x="625034" y="1810627"/>
             <a:ext cx="1875098" cy="801063"/>
           </a:xfrm>
           <a:prstGeom prst="rect">
@@ -3218,7 +3218,7 @@
             <a:pPr algn="ctr"/>
             <a:r>
               <a:rPr lang="en-US" sz="1400" dirty="0"/>
-              <a:t>X variables</a:t>
+              <a:t>50 variables</a:t>
             </a:r>
           </a:p>
         </p:txBody>
@@ -3237,7 +3237,7 @@
         </p:nvSpPr>
         <p:spPr>
           <a:xfrm>
-            <a:off x="2953474" y="1726648"/>
+            <a:off x="2953474" y="1810627"/>
             <a:ext cx="1875098" cy="801063"/>
           </a:xfrm>
           <a:prstGeom prst="rect">
@@ -3279,7 +3279,190 @@
             <a:pPr algn="ctr"/>
             <a:r>
               <a:rPr lang="en-US" sz="1400" dirty="0"/>
-              <a:t>X measures</a:t>
+              <a:t>19 measures</a:t>
+            </a:r>
+          </a:p>
+        </p:txBody>
+      </p:sp>
+      <p:sp>
+        <p:nvSpPr>
+          <p:cNvPr id="24" name="Rectangle 23">
+            <a:extLst>
+              <a:ext uri="{FF2B5EF4-FFF2-40B4-BE49-F238E27FC236}">
+                <a16:creationId xmlns:a16="http://schemas.microsoft.com/office/drawing/2014/main" id="{6B48A0E7-026B-5349-8976-8F1229487A30}"/>
+              </a:ext>
+            </a:extLst>
+          </p:cNvPr>
+          <p:cNvSpPr/>
+          <p:nvPr/>
+        </p:nvSpPr>
+        <p:spPr>
+          <a:xfrm>
+            <a:off x="625034" y="2792765"/>
+            <a:ext cx="1875098" cy="801063"/>
+          </a:xfrm>
+          <a:prstGeom prst="rect">
+            <a:avLst/>
+          </a:prstGeom>
+        </p:spPr>
+        <p:style>
+          <a:lnRef idx="2">
+            <a:schemeClr val="accent1">
+              <a:shade val="50000"/>
+            </a:schemeClr>
+          </a:lnRef>
+          <a:fillRef idx="1">
+            <a:schemeClr val="accent1"/>
+          </a:fillRef>
+          <a:effectRef idx="0">
+            <a:schemeClr val="accent1"/>
+          </a:effectRef>
+          <a:fontRef idx="minor">
+            <a:schemeClr val="lt1"/>
+          </a:fontRef>
+        </p:style>
+        <p:txBody>
+          <a:bodyPr rot="0" spcFirstLastPara="0" vertOverflow="overflow" horzOverflow="overflow" vert="horz" wrap="square" lIns="91440" tIns="45720" rIns="91440" bIns="45720" numCol="1" spcCol="0" rtlCol="0" fromWordArt="0" anchor="ctr" anchorCtr="0" forceAA="0" compatLnSpc="1">
+            <a:prstTxWarp prst="textNoShape">
+              <a:avLst/>
+            </a:prstTxWarp>
+            <a:noAutofit/>
+          </a:bodyPr>
+          <a:lstStyle/>
+          <a:p>
+            <a:pPr algn="ctr"/>
+            <a:r>
+              <a:rPr lang="en-US" dirty="0"/>
+              <a:t>Hospital Acquired Conditions</a:t>
+            </a:r>
+          </a:p>
+          <a:p>
+            <a:pPr algn="ctr"/>
+            <a:r>
+              <a:rPr lang="en-US" sz="1400" dirty="0"/>
+              <a:t>28 variables</a:t>
+            </a:r>
+          </a:p>
+        </p:txBody>
+      </p:sp>
+      <p:sp>
+        <p:nvSpPr>
+          <p:cNvPr id="25" name="Rectangle 24">
+            <a:extLst>
+              <a:ext uri="{FF2B5EF4-FFF2-40B4-BE49-F238E27FC236}">
+                <a16:creationId xmlns:a16="http://schemas.microsoft.com/office/drawing/2014/main" id="{FF885ACE-960F-9C4A-BE1D-E6379CD9470B}"/>
+              </a:ext>
+            </a:extLst>
+          </p:cNvPr>
+          <p:cNvSpPr/>
+          <p:nvPr/>
+        </p:nvSpPr>
+        <p:spPr>
+          <a:xfrm>
+            <a:off x="2953474" y="2792765"/>
+            <a:ext cx="1875098" cy="801063"/>
+          </a:xfrm>
+          <a:prstGeom prst="rect">
+            <a:avLst/>
+          </a:prstGeom>
+        </p:spPr>
+        <p:style>
+          <a:lnRef idx="2">
+            <a:schemeClr val="accent1">
+              <a:shade val="50000"/>
+            </a:schemeClr>
+          </a:lnRef>
+          <a:fillRef idx="1">
+            <a:schemeClr val="accent1"/>
+          </a:fillRef>
+          <a:effectRef idx="0">
+            <a:schemeClr val="accent1"/>
+          </a:effectRef>
+          <a:fontRef idx="minor">
+            <a:schemeClr val="lt1"/>
+          </a:fontRef>
+        </p:style>
+        <p:txBody>
+          <a:bodyPr rot="0" spcFirstLastPara="0" vertOverflow="overflow" horzOverflow="overflow" vert="horz" wrap="square" lIns="91440" tIns="45720" rIns="91440" bIns="45720" numCol="1" spcCol="0" rtlCol="0" fromWordArt="0" anchor="ctr" anchorCtr="0" forceAA="0" compatLnSpc="1">
+            <a:prstTxWarp prst="textNoShape">
+              <a:avLst/>
+            </a:prstTxWarp>
+            <a:noAutofit/>
+          </a:bodyPr>
+          <a:lstStyle/>
+          <a:p>
+            <a:pPr algn="ctr"/>
+            <a:r>
+              <a:rPr lang="en-US" dirty="0"/>
+              <a:t>Excess Readmissions</a:t>
+            </a:r>
+          </a:p>
+          <a:p>
+            <a:pPr algn="ctr"/>
+            <a:r>
+              <a:rPr lang="en-US" sz="1400" dirty="0"/>
+              <a:t>6 measures</a:t>
+            </a:r>
+          </a:p>
+        </p:txBody>
+      </p:sp>
+      <p:sp>
+        <p:nvSpPr>
+          <p:cNvPr id="26" name="Rectangle 25">
+            <a:extLst>
+              <a:ext uri="{FF2B5EF4-FFF2-40B4-BE49-F238E27FC236}">
+                <a16:creationId xmlns:a16="http://schemas.microsoft.com/office/drawing/2014/main" id="{4C82B66D-E1B4-7140-A89E-9F64F952AEC1}"/>
+              </a:ext>
+            </a:extLst>
+          </p:cNvPr>
+          <p:cNvSpPr/>
+          <p:nvPr/>
+        </p:nvSpPr>
+        <p:spPr>
+          <a:xfrm>
+            <a:off x="625034" y="3774903"/>
+            <a:ext cx="1875098" cy="801063"/>
+          </a:xfrm>
+          <a:prstGeom prst="rect">
+            <a:avLst/>
+          </a:prstGeom>
+        </p:spPr>
+        <p:style>
+          <a:lnRef idx="2">
+            <a:schemeClr val="accent1">
+              <a:shade val="50000"/>
+            </a:schemeClr>
+          </a:lnRef>
+          <a:fillRef idx="1">
+            <a:schemeClr val="accent1"/>
+          </a:fillRef>
+          <a:effectRef idx="0">
+            <a:schemeClr val="accent1"/>
+          </a:effectRef>
+          <a:fontRef idx="minor">
+            <a:schemeClr val="lt1"/>
+          </a:fontRef>
+        </p:style>
+        <p:txBody>
+          <a:bodyPr rot="0" spcFirstLastPara="0" vertOverflow="overflow" horzOverflow="overflow" vert="horz" wrap="square" lIns="91440" tIns="45720" rIns="91440" bIns="45720" numCol="1" spcCol="0" rtlCol="0" fromWordArt="0" anchor="ctr" anchorCtr="0" forceAA="0" compatLnSpc="1">
+            <a:prstTxWarp prst="textNoShape">
+              <a:avLst/>
+            </a:prstTxWarp>
+            <a:noAutofit/>
+          </a:bodyPr>
+          <a:lstStyle/>
+          <a:p>
+            <a:pPr algn="ctr"/>
+            <a:r>
+              <a:rPr lang="en-US" dirty="0"/>
+              <a:t>Performance Scores</a:t>
+            </a:r>
+          </a:p>
+          <a:p>
+            <a:pPr algn="ctr"/>
+            <a:r>
+              <a:rPr lang="en-US" sz="1400" dirty="0"/>
+              <a:t>17 variables</a:t>
             </a:r>
           </a:p>
         </p:txBody>
@@ -3287,13 +3470,25 @@
     </p:spTree>
     <p:extLst>
       <p:ext uri="{BB962C8B-B14F-4D97-AF65-F5344CB8AC3E}">
-        <p14:creationId xmlns:p14="http://schemas.microsoft.com/office/powerpoint/2010/main" val="3011464272"/>
+        <p14:creationId xmlns:p14="http://schemas.microsoft.com/office/powerpoint/2010/main" val="788155643"/>
       </p:ext>
     </p:extLst>
   </p:cSld>
   <p:clrMapOvr>
     <a:masterClrMapping/>
   </p:clrMapOvr>
+  <mc:AlternateContent xmlns:mc="http://schemas.openxmlformats.org/markup-compatibility/2006">
+    <mc:Choice xmlns:p14="http://schemas.microsoft.com/office/powerpoint/2010/main" Requires="p14">
+      <p:transition spd="slow" p14:dur="2000">
+        <p:wipe dir="d"/>
+      </p:transition>
+    </mc:Choice>
+    <mc:Fallback>
+      <p:transition spd="slow">
+        <p:wipe dir="d"/>
+      </p:transition>
+    </mc:Fallback>
+  </mc:AlternateContent>
 </p:sld>
 </file>
 
@@ -3328,7 +3523,7 @@
         </p:nvSpPr>
         <p:spPr>
           <a:xfrm>
-            <a:off x="625034" y="764013"/>
+            <a:off x="625034" y="847992"/>
             <a:ext cx="1875098" cy="801063"/>
           </a:xfrm>
           <a:prstGeom prst="rect">
@@ -3389,7 +3584,7 @@
         </p:nvSpPr>
         <p:spPr>
           <a:xfrm>
-            <a:off x="2953474" y="764013"/>
+            <a:off x="2953474" y="847992"/>
             <a:ext cx="1875098" cy="801063"/>
           </a:xfrm>
           <a:prstGeom prst="rect">
@@ -3431,7 +3626,7 @@
             <a:pPr algn="ctr"/>
             <a:r>
               <a:rPr lang="en-US" sz="1400" dirty="0"/>
-              <a:t>X variables</a:t>
+              <a:t>23  claim types</a:t>
             </a:r>
           </a:p>
         </p:txBody>
@@ -3450,7 +3645,7 @@
         </p:nvSpPr>
         <p:spPr>
           <a:xfrm>
-            <a:off x="625034" y="83037"/>
+            <a:off x="625034" y="167016"/>
             <a:ext cx="4203538" cy="495781"/>
           </a:xfrm>
           <a:prstGeom prst="rect">
@@ -3520,7 +3715,7 @@
         </p:nvSpPr>
         <p:spPr>
           <a:xfrm>
-            <a:off x="5379340" y="765943"/>
+            <a:off x="5379340" y="849922"/>
             <a:ext cx="1875098" cy="801063"/>
           </a:xfrm>
           <a:prstGeom prst="rect">
@@ -3570,7 +3765,7 @@
             <a:pPr algn="ctr"/>
             <a:r>
               <a:rPr lang="en-US" sz="1400" dirty="0"/>
-              <a:t>X variables</a:t>
+              <a:t>552 variables</a:t>
             </a:r>
           </a:p>
         </p:txBody>
@@ -3589,7 +3784,7 @@
         </p:nvSpPr>
         <p:spPr>
           <a:xfrm>
-            <a:off x="5379340" y="1728577"/>
+            <a:off x="5379340" y="1812556"/>
             <a:ext cx="1875098" cy="801063"/>
           </a:xfrm>
           <a:prstGeom prst="rect">
@@ -3639,7 +3834,7 @@
             <a:pPr algn="ctr"/>
             <a:r>
               <a:rPr lang="en-US" sz="1400" dirty="0"/>
-              <a:t>X variables</a:t>
+              <a:t>14 variables</a:t>
             </a:r>
           </a:p>
         </p:txBody>
@@ -3658,7 +3853,7 @@
         </p:nvSpPr>
         <p:spPr>
           <a:xfrm>
-            <a:off x="5379341" y="84967"/>
+            <a:off x="5379341" y="168946"/>
             <a:ext cx="1875098" cy="495781"/>
           </a:xfrm>
           <a:prstGeom prst="rect">
@@ -3733,7 +3928,7 @@
         </p:nvSpPr>
         <p:spPr>
           <a:xfrm>
-            <a:off x="625034" y="1726648"/>
+            <a:off x="625034" y="1810627"/>
             <a:ext cx="1875098" cy="801063"/>
           </a:xfrm>
           <a:prstGeom prst="rect">
@@ -3775,7 +3970,7 @@
             <a:pPr algn="ctr"/>
             <a:r>
               <a:rPr lang="en-US" sz="1400" dirty="0"/>
-              <a:t>X variables</a:t>
+              <a:t>50 variables</a:t>
             </a:r>
           </a:p>
         </p:txBody>
@@ -3794,7 +3989,7 @@
         </p:nvSpPr>
         <p:spPr>
           <a:xfrm>
-            <a:off x="2953474" y="1726648"/>
+            <a:off x="2953474" y="1810627"/>
             <a:ext cx="1875098" cy="801063"/>
           </a:xfrm>
           <a:prstGeom prst="rect">
@@ -3836,7 +4031,190 @@
             <a:pPr algn="ctr"/>
             <a:r>
               <a:rPr lang="en-US" sz="1400" dirty="0"/>
-              <a:t>X measures</a:t>
+              <a:t>19 measures</a:t>
+            </a:r>
+          </a:p>
+        </p:txBody>
+      </p:sp>
+      <p:sp>
+        <p:nvSpPr>
+          <p:cNvPr id="24" name="Rectangle 23">
+            <a:extLst>
+              <a:ext uri="{FF2B5EF4-FFF2-40B4-BE49-F238E27FC236}">
+                <a16:creationId xmlns:a16="http://schemas.microsoft.com/office/drawing/2014/main" id="{6B48A0E7-026B-5349-8976-8F1229487A30}"/>
+              </a:ext>
+            </a:extLst>
+          </p:cNvPr>
+          <p:cNvSpPr/>
+          <p:nvPr/>
+        </p:nvSpPr>
+        <p:spPr>
+          <a:xfrm>
+            <a:off x="625034" y="2792765"/>
+            <a:ext cx="1875098" cy="801063"/>
+          </a:xfrm>
+          <a:prstGeom prst="rect">
+            <a:avLst/>
+          </a:prstGeom>
+        </p:spPr>
+        <p:style>
+          <a:lnRef idx="2">
+            <a:schemeClr val="accent1">
+              <a:shade val="50000"/>
+            </a:schemeClr>
+          </a:lnRef>
+          <a:fillRef idx="1">
+            <a:schemeClr val="accent1"/>
+          </a:fillRef>
+          <a:effectRef idx="0">
+            <a:schemeClr val="accent1"/>
+          </a:effectRef>
+          <a:fontRef idx="minor">
+            <a:schemeClr val="lt1"/>
+          </a:fontRef>
+        </p:style>
+        <p:txBody>
+          <a:bodyPr rot="0" spcFirstLastPara="0" vertOverflow="overflow" horzOverflow="overflow" vert="horz" wrap="square" lIns="91440" tIns="45720" rIns="91440" bIns="45720" numCol="1" spcCol="0" rtlCol="0" fromWordArt="0" anchor="ctr" anchorCtr="0" forceAA="0" compatLnSpc="1">
+            <a:prstTxWarp prst="textNoShape">
+              <a:avLst/>
+            </a:prstTxWarp>
+            <a:noAutofit/>
+          </a:bodyPr>
+          <a:lstStyle/>
+          <a:p>
+            <a:pPr algn="ctr"/>
+            <a:r>
+              <a:rPr lang="en-US" dirty="0"/>
+              <a:t>Hospital Acquired Conditions</a:t>
+            </a:r>
+          </a:p>
+          <a:p>
+            <a:pPr algn="ctr"/>
+            <a:r>
+              <a:rPr lang="en-US" sz="1400" dirty="0"/>
+              <a:t>28 variables</a:t>
+            </a:r>
+          </a:p>
+        </p:txBody>
+      </p:sp>
+      <p:sp>
+        <p:nvSpPr>
+          <p:cNvPr id="25" name="Rectangle 24">
+            <a:extLst>
+              <a:ext uri="{FF2B5EF4-FFF2-40B4-BE49-F238E27FC236}">
+                <a16:creationId xmlns:a16="http://schemas.microsoft.com/office/drawing/2014/main" id="{FF885ACE-960F-9C4A-BE1D-E6379CD9470B}"/>
+              </a:ext>
+            </a:extLst>
+          </p:cNvPr>
+          <p:cNvSpPr/>
+          <p:nvPr/>
+        </p:nvSpPr>
+        <p:spPr>
+          <a:xfrm>
+            <a:off x="2953474" y="2792765"/>
+            <a:ext cx="1875098" cy="801063"/>
+          </a:xfrm>
+          <a:prstGeom prst="rect">
+            <a:avLst/>
+          </a:prstGeom>
+        </p:spPr>
+        <p:style>
+          <a:lnRef idx="2">
+            <a:schemeClr val="accent1">
+              <a:shade val="50000"/>
+            </a:schemeClr>
+          </a:lnRef>
+          <a:fillRef idx="1">
+            <a:schemeClr val="accent1"/>
+          </a:fillRef>
+          <a:effectRef idx="0">
+            <a:schemeClr val="accent1"/>
+          </a:effectRef>
+          <a:fontRef idx="minor">
+            <a:schemeClr val="lt1"/>
+          </a:fontRef>
+        </p:style>
+        <p:txBody>
+          <a:bodyPr rot="0" spcFirstLastPara="0" vertOverflow="overflow" horzOverflow="overflow" vert="horz" wrap="square" lIns="91440" tIns="45720" rIns="91440" bIns="45720" numCol="1" spcCol="0" rtlCol="0" fromWordArt="0" anchor="ctr" anchorCtr="0" forceAA="0" compatLnSpc="1">
+            <a:prstTxWarp prst="textNoShape">
+              <a:avLst/>
+            </a:prstTxWarp>
+            <a:noAutofit/>
+          </a:bodyPr>
+          <a:lstStyle/>
+          <a:p>
+            <a:pPr algn="ctr"/>
+            <a:r>
+              <a:rPr lang="en-US" dirty="0"/>
+              <a:t>Excess Readmissions</a:t>
+            </a:r>
+          </a:p>
+          <a:p>
+            <a:pPr algn="ctr"/>
+            <a:r>
+              <a:rPr lang="en-US" sz="1400" dirty="0"/>
+              <a:t>6 measures</a:t>
+            </a:r>
+          </a:p>
+        </p:txBody>
+      </p:sp>
+      <p:sp>
+        <p:nvSpPr>
+          <p:cNvPr id="26" name="Rectangle 25">
+            <a:extLst>
+              <a:ext uri="{FF2B5EF4-FFF2-40B4-BE49-F238E27FC236}">
+                <a16:creationId xmlns:a16="http://schemas.microsoft.com/office/drawing/2014/main" id="{4C82B66D-E1B4-7140-A89E-9F64F952AEC1}"/>
+              </a:ext>
+            </a:extLst>
+          </p:cNvPr>
+          <p:cNvSpPr/>
+          <p:nvPr/>
+        </p:nvSpPr>
+        <p:spPr>
+          <a:xfrm>
+            <a:off x="625034" y="3774903"/>
+            <a:ext cx="1875098" cy="801063"/>
+          </a:xfrm>
+          <a:prstGeom prst="rect">
+            <a:avLst/>
+          </a:prstGeom>
+        </p:spPr>
+        <p:style>
+          <a:lnRef idx="2">
+            <a:schemeClr val="accent1">
+              <a:shade val="50000"/>
+            </a:schemeClr>
+          </a:lnRef>
+          <a:fillRef idx="1">
+            <a:schemeClr val="accent1"/>
+          </a:fillRef>
+          <a:effectRef idx="0">
+            <a:schemeClr val="accent1"/>
+          </a:effectRef>
+          <a:fontRef idx="minor">
+            <a:schemeClr val="lt1"/>
+          </a:fontRef>
+        </p:style>
+        <p:txBody>
+          <a:bodyPr rot="0" spcFirstLastPara="0" vertOverflow="overflow" horzOverflow="overflow" vert="horz" wrap="square" lIns="91440" tIns="45720" rIns="91440" bIns="45720" numCol="1" spcCol="0" rtlCol="0" fromWordArt="0" anchor="ctr" anchorCtr="0" forceAA="0" compatLnSpc="1">
+            <a:prstTxWarp prst="textNoShape">
+              <a:avLst/>
+            </a:prstTxWarp>
+            <a:noAutofit/>
+          </a:bodyPr>
+          <a:lstStyle/>
+          <a:p>
+            <a:pPr algn="ctr"/>
+            <a:r>
+              <a:rPr lang="en-US" dirty="0"/>
+              <a:t>Performance Scores</a:t>
+            </a:r>
+          </a:p>
+          <a:p>
+            <a:pPr algn="ctr"/>
+            <a:r>
+              <a:rPr lang="en-US" sz="1400" dirty="0"/>
+              <a:t>17 variables</a:t>
             </a:r>
           </a:p>
         </p:txBody>
@@ -3844,7 +4222,7 @@
     </p:spTree>
     <p:extLst>
       <p:ext uri="{BB962C8B-B14F-4D97-AF65-F5344CB8AC3E}">
-        <p14:creationId xmlns:p14="http://schemas.microsoft.com/office/powerpoint/2010/main" val="3818676526"/>
+        <p14:creationId xmlns:p14="http://schemas.microsoft.com/office/powerpoint/2010/main" val="1783781589"/>
       </p:ext>
     </p:extLst>
   </p:cSld>
@@ -3897,7 +4275,7 @@
         </p:nvSpPr>
         <p:spPr>
           <a:xfrm>
-            <a:off x="625034" y="764013"/>
+            <a:off x="625034" y="847992"/>
             <a:ext cx="1875098" cy="801063"/>
           </a:xfrm>
           <a:prstGeom prst="rect">
@@ -3958,7 +4336,7 @@
         </p:nvSpPr>
         <p:spPr>
           <a:xfrm>
-            <a:off x="2953474" y="764013"/>
+            <a:off x="2953474" y="847992"/>
             <a:ext cx="1875098" cy="801063"/>
           </a:xfrm>
           <a:prstGeom prst="rect">
@@ -4000,7 +4378,7 @@
             <a:pPr algn="ctr"/>
             <a:r>
               <a:rPr lang="en-US" sz="1400" dirty="0"/>
-              <a:t>X variables</a:t>
+              <a:t>23  claim types</a:t>
             </a:r>
           </a:p>
         </p:txBody>
@@ -4019,7 +4397,7 @@
         </p:nvSpPr>
         <p:spPr>
           <a:xfrm>
-            <a:off x="625034" y="83037"/>
+            <a:off x="625034" y="167016"/>
             <a:ext cx="4203538" cy="495781"/>
           </a:xfrm>
           <a:prstGeom prst="rect">
@@ -4089,7 +4467,7 @@
         </p:nvSpPr>
         <p:spPr>
           <a:xfrm>
-            <a:off x="5379340" y="765943"/>
+            <a:off x="5379340" y="849922"/>
             <a:ext cx="1875098" cy="801063"/>
           </a:xfrm>
           <a:prstGeom prst="rect">
@@ -4139,7 +4517,7 @@
             <a:pPr algn="ctr"/>
             <a:r>
               <a:rPr lang="en-US" sz="1400" dirty="0"/>
-              <a:t>X variables</a:t>
+              <a:t>552 variables</a:t>
             </a:r>
           </a:p>
         </p:txBody>
@@ -4158,7 +4536,7 @@
         </p:nvSpPr>
         <p:spPr>
           <a:xfrm>
-            <a:off x="5379340" y="1728577"/>
+            <a:off x="5379340" y="1812556"/>
             <a:ext cx="1875098" cy="801063"/>
           </a:xfrm>
           <a:prstGeom prst="rect">
@@ -4208,7 +4586,7 @@
             <a:pPr algn="ctr"/>
             <a:r>
               <a:rPr lang="en-US" sz="1400" dirty="0"/>
-              <a:t>X variables</a:t>
+              <a:t>14 variables</a:t>
             </a:r>
           </a:p>
         </p:txBody>
@@ -4227,7 +4605,7 @@
         </p:nvSpPr>
         <p:spPr>
           <a:xfrm>
-            <a:off x="5379341" y="84967"/>
+            <a:off x="5379341" y="168946"/>
             <a:ext cx="1875098" cy="495781"/>
           </a:xfrm>
           <a:prstGeom prst="rect">
@@ -4302,7 +4680,7 @@
         </p:nvSpPr>
         <p:spPr>
           <a:xfrm>
-            <a:off x="7826433" y="83037"/>
+            <a:off x="7826433" y="167016"/>
             <a:ext cx="1875098" cy="495781"/>
           </a:xfrm>
           <a:prstGeom prst="rect">
@@ -4358,7 +4736,7 @@
                   <a:schemeClr val="accent4"/>
                 </a:solidFill>
               </a:rPr>
-              <a:t>State-Level</a:t>
+              <a:t>State Level</a:t>
             </a:r>
           </a:p>
         </p:txBody>
@@ -4377,7 +4755,7 @@
         </p:nvSpPr>
         <p:spPr>
           <a:xfrm>
-            <a:off x="7826433" y="764014"/>
+            <a:off x="7826433" y="847993"/>
             <a:ext cx="1875098" cy="801063"/>
           </a:xfrm>
           <a:prstGeom prst="rect">
@@ -4443,7 +4821,7 @@
         </p:nvSpPr>
         <p:spPr>
           <a:xfrm>
-            <a:off x="625034" y="1726648"/>
+            <a:off x="625034" y="1810627"/>
             <a:ext cx="1875098" cy="801063"/>
           </a:xfrm>
           <a:prstGeom prst="rect">
@@ -4485,7 +4863,7 @@
             <a:pPr algn="ctr"/>
             <a:r>
               <a:rPr lang="en-US" sz="1400" dirty="0"/>
-              <a:t>X variables</a:t>
+              <a:t>50 variables</a:t>
             </a:r>
           </a:p>
         </p:txBody>
@@ -4504,7 +4882,7 @@
         </p:nvSpPr>
         <p:spPr>
           <a:xfrm>
-            <a:off x="2953474" y="1726648"/>
+            <a:off x="2953474" y="1810627"/>
             <a:ext cx="1875098" cy="801063"/>
           </a:xfrm>
           <a:prstGeom prst="rect">
@@ -4546,7 +4924,190 @@
             <a:pPr algn="ctr"/>
             <a:r>
               <a:rPr lang="en-US" sz="1400" dirty="0"/>
-              <a:t>X measures</a:t>
+              <a:t>19 measures</a:t>
+            </a:r>
+          </a:p>
+        </p:txBody>
+      </p:sp>
+      <p:sp>
+        <p:nvSpPr>
+          <p:cNvPr id="24" name="Rectangle 23">
+            <a:extLst>
+              <a:ext uri="{FF2B5EF4-FFF2-40B4-BE49-F238E27FC236}">
+                <a16:creationId xmlns:a16="http://schemas.microsoft.com/office/drawing/2014/main" id="{6B48A0E7-026B-5349-8976-8F1229487A30}"/>
+              </a:ext>
+            </a:extLst>
+          </p:cNvPr>
+          <p:cNvSpPr/>
+          <p:nvPr/>
+        </p:nvSpPr>
+        <p:spPr>
+          <a:xfrm>
+            <a:off x="625034" y="2792765"/>
+            <a:ext cx="1875098" cy="801063"/>
+          </a:xfrm>
+          <a:prstGeom prst="rect">
+            <a:avLst/>
+          </a:prstGeom>
+        </p:spPr>
+        <p:style>
+          <a:lnRef idx="2">
+            <a:schemeClr val="accent1">
+              <a:shade val="50000"/>
+            </a:schemeClr>
+          </a:lnRef>
+          <a:fillRef idx="1">
+            <a:schemeClr val="accent1"/>
+          </a:fillRef>
+          <a:effectRef idx="0">
+            <a:schemeClr val="accent1"/>
+          </a:effectRef>
+          <a:fontRef idx="minor">
+            <a:schemeClr val="lt1"/>
+          </a:fontRef>
+        </p:style>
+        <p:txBody>
+          <a:bodyPr rot="0" spcFirstLastPara="0" vertOverflow="overflow" horzOverflow="overflow" vert="horz" wrap="square" lIns="91440" tIns="45720" rIns="91440" bIns="45720" numCol="1" spcCol="0" rtlCol="0" fromWordArt="0" anchor="ctr" anchorCtr="0" forceAA="0" compatLnSpc="1">
+            <a:prstTxWarp prst="textNoShape">
+              <a:avLst/>
+            </a:prstTxWarp>
+            <a:noAutofit/>
+          </a:bodyPr>
+          <a:lstStyle/>
+          <a:p>
+            <a:pPr algn="ctr"/>
+            <a:r>
+              <a:rPr lang="en-US" dirty="0"/>
+              <a:t>Hospital Acquired Conditions</a:t>
+            </a:r>
+          </a:p>
+          <a:p>
+            <a:pPr algn="ctr"/>
+            <a:r>
+              <a:rPr lang="en-US" sz="1400" dirty="0"/>
+              <a:t>28 variables</a:t>
+            </a:r>
+          </a:p>
+        </p:txBody>
+      </p:sp>
+      <p:sp>
+        <p:nvSpPr>
+          <p:cNvPr id="25" name="Rectangle 24">
+            <a:extLst>
+              <a:ext uri="{FF2B5EF4-FFF2-40B4-BE49-F238E27FC236}">
+                <a16:creationId xmlns:a16="http://schemas.microsoft.com/office/drawing/2014/main" id="{FF885ACE-960F-9C4A-BE1D-E6379CD9470B}"/>
+              </a:ext>
+            </a:extLst>
+          </p:cNvPr>
+          <p:cNvSpPr/>
+          <p:nvPr/>
+        </p:nvSpPr>
+        <p:spPr>
+          <a:xfrm>
+            <a:off x="2953474" y="2792765"/>
+            <a:ext cx="1875098" cy="801063"/>
+          </a:xfrm>
+          <a:prstGeom prst="rect">
+            <a:avLst/>
+          </a:prstGeom>
+        </p:spPr>
+        <p:style>
+          <a:lnRef idx="2">
+            <a:schemeClr val="accent1">
+              <a:shade val="50000"/>
+            </a:schemeClr>
+          </a:lnRef>
+          <a:fillRef idx="1">
+            <a:schemeClr val="accent1"/>
+          </a:fillRef>
+          <a:effectRef idx="0">
+            <a:schemeClr val="accent1"/>
+          </a:effectRef>
+          <a:fontRef idx="minor">
+            <a:schemeClr val="lt1"/>
+          </a:fontRef>
+        </p:style>
+        <p:txBody>
+          <a:bodyPr rot="0" spcFirstLastPara="0" vertOverflow="overflow" horzOverflow="overflow" vert="horz" wrap="square" lIns="91440" tIns="45720" rIns="91440" bIns="45720" numCol="1" spcCol="0" rtlCol="0" fromWordArt="0" anchor="ctr" anchorCtr="0" forceAA="0" compatLnSpc="1">
+            <a:prstTxWarp prst="textNoShape">
+              <a:avLst/>
+            </a:prstTxWarp>
+            <a:noAutofit/>
+          </a:bodyPr>
+          <a:lstStyle/>
+          <a:p>
+            <a:pPr algn="ctr"/>
+            <a:r>
+              <a:rPr lang="en-US" dirty="0"/>
+              <a:t>Excess Readmissions</a:t>
+            </a:r>
+          </a:p>
+          <a:p>
+            <a:pPr algn="ctr"/>
+            <a:r>
+              <a:rPr lang="en-US" sz="1400" dirty="0"/>
+              <a:t>6 measures</a:t>
+            </a:r>
+          </a:p>
+        </p:txBody>
+      </p:sp>
+      <p:sp>
+        <p:nvSpPr>
+          <p:cNvPr id="26" name="Rectangle 25">
+            <a:extLst>
+              <a:ext uri="{FF2B5EF4-FFF2-40B4-BE49-F238E27FC236}">
+                <a16:creationId xmlns:a16="http://schemas.microsoft.com/office/drawing/2014/main" id="{4C82B66D-E1B4-7140-A89E-9F64F952AEC1}"/>
+              </a:ext>
+            </a:extLst>
+          </p:cNvPr>
+          <p:cNvSpPr/>
+          <p:nvPr/>
+        </p:nvSpPr>
+        <p:spPr>
+          <a:xfrm>
+            <a:off x="625034" y="3774903"/>
+            <a:ext cx="1875098" cy="801063"/>
+          </a:xfrm>
+          <a:prstGeom prst="rect">
+            <a:avLst/>
+          </a:prstGeom>
+        </p:spPr>
+        <p:style>
+          <a:lnRef idx="2">
+            <a:schemeClr val="accent1">
+              <a:shade val="50000"/>
+            </a:schemeClr>
+          </a:lnRef>
+          <a:fillRef idx="1">
+            <a:schemeClr val="accent1"/>
+          </a:fillRef>
+          <a:effectRef idx="0">
+            <a:schemeClr val="accent1"/>
+          </a:effectRef>
+          <a:fontRef idx="minor">
+            <a:schemeClr val="lt1"/>
+          </a:fontRef>
+        </p:style>
+        <p:txBody>
+          <a:bodyPr rot="0" spcFirstLastPara="0" vertOverflow="overflow" horzOverflow="overflow" vert="horz" wrap="square" lIns="91440" tIns="45720" rIns="91440" bIns="45720" numCol="1" spcCol="0" rtlCol="0" fromWordArt="0" anchor="ctr" anchorCtr="0" forceAA="0" compatLnSpc="1">
+            <a:prstTxWarp prst="textNoShape">
+              <a:avLst/>
+            </a:prstTxWarp>
+            <a:noAutofit/>
+          </a:bodyPr>
+          <a:lstStyle/>
+          <a:p>
+            <a:pPr algn="ctr"/>
+            <a:r>
+              <a:rPr lang="en-US" dirty="0"/>
+              <a:t>Performance Scores</a:t>
+            </a:r>
+          </a:p>
+          <a:p>
+            <a:pPr algn="ctr"/>
+            <a:r>
+              <a:rPr lang="en-US" sz="1400" dirty="0"/>
+              <a:t>17 variables</a:t>
             </a:r>
           </a:p>
         </p:txBody>
@@ -4554,7 +5115,7 @@
     </p:spTree>
     <p:extLst>
       <p:ext uri="{BB962C8B-B14F-4D97-AF65-F5344CB8AC3E}">
-        <p14:creationId xmlns:p14="http://schemas.microsoft.com/office/powerpoint/2010/main" val="187979673"/>
+        <p14:creationId xmlns:p14="http://schemas.microsoft.com/office/powerpoint/2010/main" val="65127610"/>
       </p:ext>
     </p:extLst>
   </p:cSld>
@@ -4607,7 +5168,7 @@
         </p:nvSpPr>
         <p:spPr>
           <a:xfrm>
-            <a:off x="625034" y="764013"/>
+            <a:off x="625034" y="847992"/>
             <a:ext cx="1875098" cy="801063"/>
           </a:xfrm>
           <a:prstGeom prst="rect">
@@ -4668,7 +5229,7 @@
         </p:nvSpPr>
         <p:spPr>
           <a:xfrm>
-            <a:off x="2953474" y="764013"/>
+            <a:off x="2953474" y="847992"/>
             <a:ext cx="1875098" cy="801063"/>
           </a:xfrm>
           <a:prstGeom prst="rect">
@@ -4710,7 +5271,7 @@
             <a:pPr algn="ctr"/>
             <a:r>
               <a:rPr lang="en-US" sz="1400" dirty="0"/>
-              <a:t>X variables</a:t>
+              <a:t>23  claim types</a:t>
             </a:r>
           </a:p>
         </p:txBody>
@@ -4729,7 +5290,7 @@
         </p:nvSpPr>
         <p:spPr>
           <a:xfrm>
-            <a:off x="625034" y="83037"/>
+            <a:off x="625034" y="167016"/>
             <a:ext cx="4203538" cy="495781"/>
           </a:xfrm>
           <a:prstGeom prst="rect">
@@ -4799,7 +5360,7 @@
         </p:nvSpPr>
         <p:spPr>
           <a:xfrm>
-            <a:off x="5379340" y="765943"/>
+            <a:off x="5379340" y="849922"/>
             <a:ext cx="1875098" cy="801063"/>
           </a:xfrm>
           <a:prstGeom prst="rect">
@@ -4849,7 +5410,7 @@
             <a:pPr algn="ctr"/>
             <a:r>
               <a:rPr lang="en-US" sz="1400" dirty="0"/>
-              <a:t>X variables</a:t>
+              <a:t>552 variables</a:t>
             </a:r>
           </a:p>
         </p:txBody>
@@ -4868,7 +5429,7 @@
         </p:nvSpPr>
         <p:spPr>
           <a:xfrm>
-            <a:off x="5379340" y="1728577"/>
+            <a:off x="5379340" y="1812556"/>
             <a:ext cx="1875098" cy="801063"/>
           </a:xfrm>
           <a:prstGeom prst="rect">
@@ -4918,7 +5479,7 @@
             <a:pPr algn="ctr"/>
             <a:r>
               <a:rPr lang="en-US" sz="1400" dirty="0"/>
-              <a:t>X variables</a:t>
+              <a:t>14 variables</a:t>
             </a:r>
           </a:p>
         </p:txBody>
@@ -4937,7 +5498,7 @@
         </p:nvSpPr>
         <p:spPr>
           <a:xfrm>
-            <a:off x="5379341" y="84967"/>
+            <a:off x="5379341" y="168946"/>
             <a:ext cx="1875098" cy="495781"/>
           </a:xfrm>
           <a:prstGeom prst="rect">
@@ -5012,7 +5573,7 @@
         </p:nvSpPr>
         <p:spPr>
           <a:xfrm>
-            <a:off x="7826433" y="83037"/>
+            <a:off x="7826433" y="167016"/>
             <a:ext cx="1875098" cy="495781"/>
           </a:xfrm>
           <a:prstGeom prst="rect">
@@ -5068,7 +5629,7 @@
                   <a:schemeClr val="accent4"/>
                 </a:solidFill>
               </a:rPr>
-              <a:t>State-Level</a:t>
+              <a:t>State Level</a:t>
             </a:r>
           </a:p>
         </p:txBody>
@@ -5087,7 +5648,7 @@
         </p:nvSpPr>
         <p:spPr>
           <a:xfrm>
-            <a:off x="7826433" y="764014"/>
+            <a:off x="7826433" y="847993"/>
             <a:ext cx="1875098" cy="801063"/>
           </a:xfrm>
           <a:prstGeom prst="rect">
@@ -5153,7 +5714,7 @@
         </p:nvSpPr>
         <p:spPr>
           <a:xfrm rot="5400000">
-            <a:off x="2397889" y="889401"/>
+            <a:off x="2397890" y="2913025"/>
             <a:ext cx="657829" cy="4203540"/>
           </a:xfrm>
           <a:prstGeom prst="rightBrace">
@@ -5203,7 +5764,7 @@
         </p:nvSpPr>
         <p:spPr>
           <a:xfrm rot="5400000">
-            <a:off x="6057659" y="2024929"/>
+            <a:off x="6057659" y="2108908"/>
             <a:ext cx="597540" cy="1875097"/>
           </a:xfrm>
           <a:prstGeom prst="rightBrace">
@@ -5260,7 +5821,7 @@
         </p:nvSpPr>
         <p:spPr>
           <a:xfrm rot="5400000">
-            <a:off x="8435068" y="2053623"/>
+            <a:off x="8435069" y="1151485"/>
             <a:ext cx="657829" cy="1875099"/>
           </a:xfrm>
           <a:prstGeom prst="rightBrace">
@@ -5296,7 +5857,7 @@
           <a:lstStyle/>
           <a:p>
             <a:pPr algn="ctr"/>
-            <a:endParaRPr lang="en-US"/>
+            <a:endParaRPr lang="en-US" dirty="0"/>
           </a:p>
         </p:txBody>
       </p:sp>
@@ -5314,7 +5875,7 @@
         </p:nvSpPr>
         <p:spPr>
           <a:xfrm>
-            <a:off x="4773108" y="4491987"/>
+            <a:off x="4773108" y="5597939"/>
             <a:ext cx="3166642" cy="1096701"/>
           </a:xfrm>
           <a:prstGeom prst="ellipse">
@@ -5376,8 +5937,8 @@
         </p:nvSpPr>
         <p:spPr>
           <a:xfrm rot="10800000">
-            <a:off x="8027056" y="3394359"/>
-            <a:ext cx="781278" cy="1745676"/>
+            <a:off x="8027056" y="2529013"/>
+            <a:ext cx="781278" cy="3746280"/>
           </a:xfrm>
           <a:prstGeom prst="bentArrow">
             <a:avLst>
@@ -5444,14 +6005,14 @@
         </p:nvSpPr>
         <p:spPr>
           <a:xfrm rot="10800000" flipH="1">
-            <a:off x="2662178" y="3394357"/>
-            <a:ext cx="2023625" cy="1856515"/>
+            <a:off x="2662178" y="5417979"/>
+            <a:ext cx="2110930" cy="857314"/>
           </a:xfrm>
           <a:prstGeom prst="bentArrow">
             <a:avLst>
-              <a:gd name="adj1" fmla="val 5876"/>
-              <a:gd name="adj2" fmla="val 9382"/>
-              <a:gd name="adj3" fmla="val 16045"/>
+              <a:gd name="adj1" fmla="val 13019"/>
+              <a:gd name="adj2" fmla="val 18311"/>
+              <a:gd name="adj3" fmla="val 26449"/>
               <a:gd name="adj4" fmla="val 66765"/>
             </a:avLst>
           </a:prstGeom>
@@ -5512,7 +6073,7 @@
         </p:nvSpPr>
         <p:spPr>
           <a:xfrm>
-            <a:off x="625034" y="1726648"/>
+            <a:off x="625034" y="1810627"/>
             <a:ext cx="1875098" cy="801063"/>
           </a:xfrm>
           <a:prstGeom prst="rect">
@@ -5554,7 +6115,7 @@
             <a:pPr algn="ctr"/>
             <a:r>
               <a:rPr lang="en-US" sz="1400" dirty="0"/>
-              <a:t>X variables</a:t>
+              <a:t>50 variables</a:t>
             </a:r>
           </a:p>
         </p:txBody>
@@ -5573,7 +6134,7 @@
         </p:nvSpPr>
         <p:spPr>
           <a:xfrm>
-            <a:off x="2953474" y="1726648"/>
+            <a:off x="2953474" y="1810627"/>
             <a:ext cx="1875098" cy="801063"/>
           </a:xfrm>
           <a:prstGeom prst="rect">
@@ -5615,7 +6176,7 @@
             <a:pPr algn="ctr"/>
             <a:r>
               <a:rPr lang="en-US" sz="1400" dirty="0"/>
-              <a:t>X measures</a:t>
+              <a:t>19 measures</a:t>
             </a:r>
           </a:p>
         </p:txBody>
@@ -5634,8 +6195,8 @@
         </p:nvSpPr>
         <p:spPr>
           <a:xfrm>
-            <a:off x="6246470" y="3310926"/>
-            <a:ext cx="237457" cy="1122222"/>
+            <a:off x="6246471" y="3394903"/>
+            <a:ext cx="297764" cy="2064785"/>
           </a:xfrm>
           <a:prstGeom prst="downArrow">
             <a:avLst/>
@@ -5679,10 +6240,193 @@
           </a:p>
         </p:txBody>
       </p:sp>
+      <p:sp>
+        <p:nvSpPr>
+          <p:cNvPr id="24" name="Rectangle 23">
+            <a:extLst>
+              <a:ext uri="{FF2B5EF4-FFF2-40B4-BE49-F238E27FC236}">
+                <a16:creationId xmlns:a16="http://schemas.microsoft.com/office/drawing/2014/main" id="{6B48A0E7-026B-5349-8976-8F1229487A30}"/>
+              </a:ext>
+            </a:extLst>
+          </p:cNvPr>
+          <p:cNvSpPr/>
+          <p:nvPr/>
+        </p:nvSpPr>
+        <p:spPr>
+          <a:xfrm>
+            <a:off x="625034" y="2792765"/>
+            <a:ext cx="1875098" cy="801063"/>
+          </a:xfrm>
+          <a:prstGeom prst="rect">
+            <a:avLst/>
+          </a:prstGeom>
+        </p:spPr>
+        <p:style>
+          <a:lnRef idx="2">
+            <a:schemeClr val="accent1">
+              <a:shade val="50000"/>
+            </a:schemeClr>
+          </a:lnRef>
+          <a:fillRef idx="1">
+            <a:schemeClr val="accent1"/>
+          </a:fillRef>
+          <a:effectRef idx="0">
+            <a:schemeClr val="accent1"/>
+          </a:effectRef>
+          <a:fontRef idx="minor">
+            <a:schemeClr val="lt1"/>
+          </a:fontRef>
+        </p:style>
+        <p:txBody>
+          <a:bodyPr rot="0" spcFirstLastPara="0" vertOverflow="overflow" horzOverflow="overflow" vert="horz" wrap="square" lIns="91440" tIns="45720" rIns="91440" bIns="45720" numCol="1" spcCol="0" rtlCol="0" fromWordArt="0" anchor="ctr" anchorCtr="0" forceAA="0" compatLnSpc="1">
+            <a:prstTxWarp prst="textNoShape">
+              <a:avLst/>
+            </a:prstTxWarp>
+            <a:noAutofit/>
+          </a:bodyPr>
+          <a:lstStyle/>
+          <a:p>
+            <a:pPr algn="ctr"/>
+            <a:r>
+              <a:rPr lang="en-US" dirty="0"/>
+              <a:t>Hospital Acquired Conditions</a:t>
+            </a:r>
+          </a:p>
+          <a:p>
+            <a:pPr algn="ctr"/>
+            <a:r>
+              <a:rPr lang="en-US" sz="1400" dirty="0"/>
+              <a:t>28 variables</a:t>
+            </a:r>
+          </a:p>
+        </p:txBody>
+      </p:sp>
+      <p:sp>
+        <p:nvSpPr>
+          <p:cNvPr id="25" name="Rectangle 24">
+            <a:extLst>
+              <a:ext uri="{FF2B5EF4-FFF2-40B4-BE49-F238E27FC236}">
+                <a16:creationId xmlns:a16="http://schemas.microsoft.com/office/drawing/2014/main" id="{FF885ACE-960F-9C4A-BE1D-E6379CD9470B}"/>
+              </a:ext>
+            </a:extLst>
+          </p:cNvPr>
+          <p:cNvSpPr/>
+          <p:nvPr/>
+        </p:nvSpPr>
+        <p:spPr>
+          <a:xfrm>
+            <a:off x="2953474" y="2792765"/>
+            <a:ext cx="1875098" cy="801063"/>
+          </a:xfrm>
+          <a:prstGeom prst="rect">
+            <a:avLst/>
+          </a:prstGeom>
+        </p:spPr>
+        <p:style>
+          <a:lnRef idx="2">
+            <a:schemeClr val="accent1">
+              <a:shade val="50000"/>
+            </a:schemeClr>
+          </a:lnRef>
+          <a:fillRef idx="1">
+            <a:schemeClr val="accent1"/>
+          </a:fillRef>
+          <a:effectRef idx="0">
+            <a:schemeClr val="accent1"/>
+          </a:effectRef>
+          <a:fontRef idx="minor">
+            <a:schemeClr val="lt1"/>
+          </a:fontRef>
+        </p:style>
+        <p:txBody>
+          <a:bodyPr rot="0" spcFirstLastPara="0" vertOverflow="overflow" horzOverflow="overflow" vert="horz" wrap="square" lIns="91440" tIns="45720" rIns="91440" bIns="45720" numCol="1" spcCol="0" rtlCol="0" fromWordArt="0" anchor="ctr" anchorCtr="0" forceAA="0" compatLnSpc="1">
+            <a:prstTxWarp prst="textNoShape">
+              <a:avLst/>
+            </a:prstTxWarp>
+            <a:noAutofit/>
+          </a:bodyPr>
+          <a:lstStyle/>
+          <a:p>
+            <a:pPr algn="ctr"/>
+            <a:r>
+              <a:rPr lang="en-US" dirty="0"/>
+              <a:t>Excess Readmissions</a:t>
+            </a:r>
+          </a:p>
+          <a:p>
+            <a:pPr algn="ctr"/>
+            <a:r>
+              <a:rPr lang="en-US" sz="1400" dirty="0"/>
+              <a:t>6 measures</a:t>
+            </a:r>
+          </a:p>
+        </p:txBody>
+      </p:sp>
+      <p:sp>
+        <p:nvSpPr>
+          <p:cNvPr id="26" name="Rectangle 25">
+            <a:extLst>
+              <a:ext uri="{FF2B5EF4-FFF2-40B4-BE49-F238E27FC236}">
+                <a16:creationId xmlns:a16="http://schemas.microsoft.com/office/drawing/2014/main" id="{4C82B66D-E1B4-7140-A89E-9F64F952AEC1}"/>
+              </a:ext>
+            </a:extLst>
+          </p:cNvPr>
+          <p:cNvSpPr/>
+          <p:nvPr/>
+        </p:nvSpPr>
+        <p:spPr>
+          <a:xfrm>
+            <a:off x="625034" y="3774903"/>
+            <a:ext cx="1875098" cy="801063"/>
+          </a:xfrm>
+          <a:prstGeom prst="rect">
+            <a:avLst/>
+          </a:prstGeom>
+        </p:spPr>
+        <p:style>
+          <a:lnRef idx="2">
+            <a:schemeClr val="accent1">
+              <a:shade val="50000"/>
+            </a:schemeClr>
+          </a:lnRef>
+          <a:fillRef idx="1">
+            <a:schemeClr val="accent1"/>
+          </a:fillRef>
+          <a:effectRef idx="0">
+            <a:schemeClr val="accent1"/>
+          </a:effectRef>
+          <a:fontRef idx="minor">
+            <a:schemeClr val="lt1"/>
+          </a:fontRef>
+        </p:style>
+        <p:txBody>
+          <a:bodyPr rot="0" spcFirstLastPara="0" vertOverflow="overflow" horzOverflow="overflow" vert="horz" wrap="square" lIns="91440" tIns="45720" rIns="91440" bIns="45720" numCol="1" spcCol="0" rtlCol="0" fromWordArt="0" anchor="ctr" anchorCtr="0" forceAA="0" compatLnSpc="1">
+            <a:prstTxWarp prst="textNoShape">
+              <a:avLst/>
+            </a:prstTxWarp>
+            <a:noAutofit/>
+          </a:bodyPr>
+          <a:lstStyle/>
+          <a:p>
+            <a:pPr algn="ctr"/>
+            <a:r>
+              <a:rPr lang="en-US" dirty="0"/>
+              <a:t>Performance Scores</a:t>
+            </a:r>
+          </a:p>
+          <a:p>
+            <a:pPr algn="ctr"/>
+            <a:r>
+              <a:rPr lang="en-US" sz="1400" dirty="0"/>
+              <a:t>17 variables</a:t>
+            </a:r>
+          </a:p>
+        </p:txBody>
+      </p:sp>
     </p:spTree>
     <p:extLst>
       <p:ext uri="{BB962C8B-B14F-4D97-AF65-F5344CB8AC3E}">
-        <p14:creationId xmlns:p14="http://schemas.microsoft.com/office/powerpoint/2010/main" val="2891096469"/>
+        <p14:creationId xmlns:p14="http://schemas.microsoft.com/office/powerpoint/2010/main" val="211554211"/>
       </p:ext>
     </p:extLst>
   </p:cSld>
@@ -5735,7 +6479,7 @@
         </p:nvSpPr>
         <p:spPr>
           <a:xfrm>
-            <a:off x="625034" y="764013"/>
+            <a:off x="625034" y="847992"/>
             <a:ext cx="1875098" cy="801063"/>
           </a:xfrm>
           <a:prstGeom prst="rect">
@@ -5796,7 +6540,7 @@
         </p:nvSpPr>
         <p:spPr>
           <a:xfrm>
-            <a:off x="2953474" y="764013"/>
+            <a:off x="2953474" y="847992"/>
             <a:ext cx="1875098" cy="801063"/>
           </a:xfrm>
           <a:prstGeom prst="rect">
@@ -5838,7 +6582,7 @@
             <a:pPr algn="ctr"/>
             <a:r>
               <a:rPr lang="en-US" sz="1400" dirty="0"/>
-              <a:t>X  claim types</a:t>
+              <a:t>23  claim types</a:t>
             </a:r>
           </a:p>
         </p:txBody>
@@ -5857,7 +6601,7 @@
         </p:nvSpPr>
         <p:spPr>
           <a:xfrm>
-            <a:off x="625034" y="83037"/>
+            <a:off x="625034" y="167016"/>
             <a:ext cx="4203538" cy="495781"/>
           </a:xfrm>
           <a:prstGeom prst="rect">
@@ -5927,7 +6671,7 @@
         </p:nvSpPr>
         <p:spPr>
           <a:xfrm>
-            <a:off x="5379340" y="765943"/>
+            <a:off x="5379340" y="849922"/>
             <a:ext cx="1875098" cy="801063"/>
           </a:xfrm>
           <a:prstGeom prst="rect">
@@ -5996,7 +6740,7 @@
         </p:nvSpPr>
         <p:spPr>
           <a:xfrm>
-            <a:off x="5379340" y="1728577"/>
+            <a:off x="5379340" y="1812556"/>
             <a:ext cx="1875098" cy="801063"/>
           </a:xfrm>
           <a:prstGeom prst="rect">
@@ -6046,7 +6790,7 @@
             <a:pPr algn="ctr"/>
             <a:r>
               <a:rPr lang="en-US" sz="1400" dirty="0"/>
-              <a:t>X variables</a:t>
+              <a:t>14 variables</a:t>
             </a:r>
           </a:p>
         </p:txBody>
@@ -6065,7 +6809,7 @@
         </p:nvSpPr>
         <p:spPr>
           <a:xfrm>
-            <a:off x="5379341" y="84967"/>
+            <a:off x="5379341" y="168946"/>
             <a:ext cx="1875098" cy="495781"/>
           </a:xfrm>
           <a:prstGeom prst="rect">
@@ -6140,7 +6884,7 @@
         </p:nvSpPr>
         <p:spPr>
           <a:xfrm>
-            <a:off x="7826433" y="83037"/>
+            <a:off x="7826433" y="167016"/>
             <a:ext cx="1875098" cy="495781"/>
           </a:xfrm>
           <a:prstGeom prst="rect">
@@ -6196,7 +6940,7 @@
                   <a:schemeClr val="accent4"/>
                 </a:solidFill>
               </a:rPr>
-              <a:t>State-Level</a:t>
+              <a:t>State Level</a:t>
             </a:r>
           </a:p>
         </p:txBody>
@@ -6215,7 +6959,7 @@
         </p:nvSpPr>
         <p:spPr>
           <a:xfrm>
-            <a:off x="7826433" y="764014"/>
+            <a:off x="7826433" y="847993"/>
             <a:ext cx="1875098" cy="801063"/>
           </a:xfrm>
           <a:prstGeom prst="rect">
@@ -6281,7 +7025,7 @@
         </p:nvSpPr>
         <p:spPr>
           <a:xfrm rot="5400000">
-            <a:off x="2397889" y="889401"/>
+            <a:off x="2397890" y="2913025"/>
             <a:ext cx="657829" cy="4203540"/>
           </a:xfrm>
           <a:prstGeom prst="rightBrace">
@@ -6331,7 +7075,7 @@
         </p:nvSpPr>
         <p:spPr>
           <a:xfrm rot="5400000">
-            <a:off x="6057659" y="2024929"/>
+            <a:off x="6057659" y="2108908"/>
             <a:ext cx="597540" cy="1875097"/>
           </a:xfrm>
           <a:prstGeom prst="rightBrace">
@@ -6388,7 +7132,7 @@
         </p:nvSpPr>
         <p:spPr>
           <a:xfrm rot="5400000">
-            <a:off x="8435068" y="2053623"/>
+            <a:off x="8435069" y="1151485"/>
             <a:ext cx="657829" cy="1875099"/>
           </a:xfrm>
           <a:prstGeom prst="rightBrace">
@@ -6424,7 +7168,7 @@
           <a:lstStyle/>
           <a:p>
             <a:pPr algn="ctr"/>
-            <a:endParaRPr lang="en-US"/>
+            <a:endParaRPr lang="en-US" dirty="0"/>
           </a:p>
         </p:txBody>
       </p:sp>
@@ -6442,7 +7186,7 @@
         </p:nvSpPr>
         <p:spPr>
           <a:xfrm>
-            <a:off x="4773108" y="4491987"/>
+            <a:off x="4773108" y="5597939"/>
             <a:ext cx="3166642" cy="1096701"/>
           </a:xfrm>
           <a:prstGeom prst="ellipse">
@@ -6504,7 +7248,7 @@
         </p:nvSpPr>
         <p:spPr>
           <a:xfrm>
-            <a:off x="4462646" y="5726938"/>
+            <a:off x="4462647" y="6832890"/>
             <a:ext cx="3787565" cy="1416935"/>
           </a:xfrm>
           <a:prstGeom prst="leftRightUpArrow">
@@ -6567,7 +7311,7 @@
         </p:nvSpPr>
         <p:spPr>
           <a:xfrm>
-            <a:off x="2812269" y="5943212"/>
+            <a:off x="2812270" y="7049164"/>
             <a:ext cx="1521107" cy="1608881"/>
           </a:xfrm>
           <a:prstGeom prst="can">
@@ -6629,7 +7373,7 @@
         </p:nvSpPr>
         <p:spPr>
           <a:xfrm>
-            <a:off x="8379481" y="5943213"/>
+            <a:off x="8379482" y="7049165"/>
             <a:ext cx="1521107" cy="1608881"/>
           </a:xfrm>
           <a:prstGeom prst="can">
@@ -6691,8 +7435,8 @@
         </p:nvSpPr>
         <p:spPr>
           <a:xfrm rot="10800000">
-            <a:off x="8027056" y="3394359"/>
-            <a:ext cx="781278" cy="1745676"/>
+            <a:off x="8027056" y="2529013"/>
+            <a:ext cx="781278" cy="3746280"/>
           </a:xfrm>
           <a:prstGeom prst="bentArrow">
             <a:avLst>
@@ -6759,14 +7503,14 @@
         </p:nvSpPr>
         <p:spPr>
           <a:xfrm rot="10800000" flipH="1">
-            <a:off x="2662178" y="3394357"/>
-            <a:ext cx="2023625" cy="1856515"/>
+            <a:off x="2662178" y="5417979"/>
+            <a:ext cx="2110930" cy="857314"/>
           </a:xfrm>
           <a:prstGeom prst="bentArrow">
             <a:avLst>
-              <a:gd name="adj1" fmla="val 5876"/>
-              <a:gd name="adj2" fmla="val 9382"/>
-              <a:gd name="adj3" fmla="val 16045"/>
+              <a:gd name="adj1" fmla="val 13019"/>
+              <a:gd name="adj2" fmla="val 18311"/>
+              <a:gd name="adj3" fmla="val 26449"/>
               <a:gd name="adj4" fmla="val 66765"/>
             </a:avLst>
           </a:prstGeom>
@@ -6827,7 +7571,7 @@
         </p:nvSpPr>
         <p:spPr>
           <a:xfrm>
-            <a:off x="625034" y="1726648"/>
+            <a:off x="625034" y="1810627"/>
             <a:ext cx="1875098" cy="801063"/>
           </a:xfrm>
           <a:prstGeom prst="rect">
@@ -6869,7 +7613,7 @@
             <a:pPr algn="ctr"/>
             <a:r>
               <a:rPr lang="en-US" sz="1400" dirty="0"/>
-              <a:t>X variables</a:t>
+              <a:t>50 variables</a:t>
             </a:r>
           </a:p>
         </p:txBody>
@@ -6888,7 +7632,7 @@
         </p:nvSpPr>
         <p:spPr>
           <a:xfrm>
-            <a:off x="2953474" y="1726648"/>
+            <a:off x="2953474" y="1810627"/>
             <a:ext cx="1875098" cy="801063"/>
           </a:xfrm>
           <a:prstGeom prst="rect">
@@ -6930,7 +7674,7 @@
             <a:pPr algn="ctr"/>
             <a:r>
               <a:rPr lang="en-US" sz="1400" dirty="0"/>
-              <a:t>X measures</a:t>
+              <a:t>19 measures</a:t>
             </a:r>
           </a:p>
         </p:txBody>
@@ -6949,8 +7693,8 @@
         </p:nvSpPr>
         <p:spPr>
           <a:xfrm>
-            <a:off x="6246470" y="3310926"/>
-            <a:ext cx="237457" cy="1122222"/>
+            <a:off x="6246471" y="3394903"/>
+            <a:ext cx="297764" cy="2064785"/>
           </a:xfrm>
           <a:prstGeom prst="downArrow">
             <a:avLst/>
@@ -6994,10 +7738,193 @@
           </a:p>
         </p:txBody>
       </p:sp>
+      <p:sp>
+        <p:nvSpPr>
+          <p:cNvPr id="24" name="Rectangle 23">
+            <a:extLst>
+              <a:ext uri="{FF2B5EF4-FFF2-40B4-BE49-F238E27FC236}">
+                <a16:creationId xmlns:a16="http://schemas.microsoft.com/office/drawing/2014/main" id="{6B48A0E7-026B-5349-8976-8F1229487A30}"/>
+              </a:ext>
+            </a:extLst>
+          </p:cNvPr>
+          <p:cNvSpPr/>
+          <p:nvPr/>
+        </p:nvSpPr>
+        <p:spPr>
+          <a:xfrm>
+            <a:off x="625034" y="2792765"/>
+            <a:ext cx="1875098" cy="801063"/>
+          </a:xfrm>
+          <a:prstGeom prst="rect">
+            <a:avLst/>
+          </a:prstGeom>
+        </p:spPr>
+        <p:style>
+          <a:lnRef idx="2">
+            <a:schemeClr val="accent1">
+              <a:shade val="50000"/>
+            </a:schemeClr>
+          </a:lnRef>
+          <a:fillRef idx="1">
+            <a:schemeClr val="accent1"/>
+          </a:fillRef>
+          <a:effectRef idx="0">
+            <a:schemeClr val="accent1"/>
+          </a:effectRef>
+          <a:fontRef idx="minor">
+            <a:schemeClr val="lt1"/>
+          </a:fontRef>
+        </p:style>
+        <p:txBody>
+          <a:bodyPr rot="0" spcFirstLastPara="0" vertOverflow="overflow" horzOverflow="overflow" vert="horz" wrap="square" lIns="91440" tIns="45720" rIns="91440" bIns="45720" numCol="1" spcCol="0" rtlCol="0" fromWordArt="0" anchor="ctr" anchorCtr="0" forceAA="0" compatLnSpc="1">
+            <a:prstTxWarp prst="textNoShape">
+              <a:avLst/>
+            </a:prstTxWarp>
+            <a:noAutofit/>
+          </a:bodyPr>
+          <a:lstStyle/>
+          <a:p>
+            <a:pPr algn="ctr"/>
+            <a:r>
+              <a:rPr lang="en-US" dirty="0"/>
+              <a:t>Hospital Acquired Conditions</a:t>
+            </a:r>
+          </a:p>
+          <a:p>
+            <a:pPr algn="ctr"/>
+            <a:r>
+              <a:rPr lang="en-US" sz="1400" dirty="0"/>
+              <a:t>28 variables</a:t>
+            </a:r>
+          </a:p>
+        </p:txBody>
+      </p:sp>
+      <p:sp>
+        <p:nvSpPr>
+          <p:cNvPr id="25" name="Rectangle 24">
+            <a:extLst>
+              <a:ext uri="{FF2B5EF4-FFF2-40B4-BE49-F238E27FC236}">
+                <a16:creationId xmlns:a16="http://schemas.microsoft.com/office/drawing/2014/main" id="{FF885ACE-960F-9C4A-BE1D-E6379CD9470B}"/>
+              </a:ext>
+            </a:extLst>
+          </p:cNvPr>
+          <p:cNvSpPr/>
+          <p:nvPr/>
+        </p:nvSpPr>
+        <p:spPr>
+          <a:xfrm>
+            <a:off x="2953474" y="2792765"/>
+            <a:ext cx="1875098" cy="801063"/>
+          </a:xfrm>
+          <a:prstGeom prst="rect">
+            <a:avLst/>
+          </a:prstGeom>
+        </p:spPr>
+        <p:style>
+          <a:lnRef idx="2">
+            <a:schemeClr val="accent1">
+              <a:shade val="50000"/>
+            </a:schemeClr>
+          </a:lnRef>
+          <a:fillRef idx="1">
+            <a:schemeClr val="accent1"/>
+          </a:fillRef>
+          <a:effectRef idx="0">
+            <a:schemeClr val="accent1"/>
+          </a:effectRef>
+          <a:fontRef idx="minor">
+            <a:schemeClr val="lt1"/>
+          </a:fontRef>
+        </p:style>
+        <p:txBody>
+          <a:bodyPr rot="0" spcFirstLastPara="0" vertOverflow="overflow" horzOverflow="overflow" vert="horz" wrap="square" lIns="91440" tIns="45720" rIns="91440" bIns="45720" numCol="1" spcCol="0" rtlCol="0" fromWordArt="0" anchor="ctr" anchorCtr="0" forceAA="0" compatLnSpc="1">
+            <a:prstTxWarp prst="textNoShape">
+              <a:avLst/>
+            </a:prstTxWarp>
+            <a:noAutofit/>
+          </a:bodyPr>
+          <a:lstStyle/>
+          <a:p>
+            <a:pPr algn="ctr"/>
+            <a:r>
+              <a:rPr lang="en-US" dirty="0"/>
+              <a:t>Excess Readmissions</a:t>
+            </a:r>
+          </a:p>
+          <a:p>
+            <a:pPr algn="ctr"/>
+            <a:r>
+              <a:rPr lang="en-US" sz="1400" dirty="0"/>
+              <a:t>6 measures</a:t>
+            </a:r>
+          </a:p>
+        </p:txBody>
+      </p:sp>
+      <p:sp>
+        <p:nvSpPr>
+          <p:cNvPr id="26" name="Rectangle 25">
+            <a:extLst>
+              <a:ext uri="{FF2B5EF4-FFF2-40B4-BE49-F238E27FC236}">
+                <a16:creationId xmlns:a16="http://schemas.microsoft.com/office/drawing/2014/main" id="{4C82B66D-E1B4-7140-A89E-9F64F952AEC1}"/>
+              </a:ext>
+            </a:extLst>
+          </p:cNvPr>
+          <p:cNvSpPr/>
+          <p:nvPr/>
+        </p:nvSpPr>
+        <p:spPr>
+          <a:xfrm>
+            <a:off x="625034" y="3774903"/>
+            <a:ext cx="1875098" cy="801063"/>
+          </a:xfrm>
+          <a:prstGeom prst="rect">
+            <a:avLst/>
+          </a:prstGeom>
+        </p:spPr>
+        <p:style>
+          <a:lnRef idx="2">
+            <a:schemeClr val="accent1">
+              <a:shade val="50000"/>
+            </a:schemeClr>
+          </a:lnRef>
+          <a:fillRef idx="1">
+            <a:schemeClr val="accent1"/>
+          </a:fillRef>
+          <a:effectRef idx="0">
+            <a:schemeClr val="accent1"/>
+          </a:effectRef>
+          <a:fontRef idx="minor">
+            <a:schemeClr val="lt1"/>
+          </a:fontRef>
+        </p:style>
+        <p:txBody>
+          <a:bodyPr rot="0" spcFirstLastPara="0" vertOverflow="overflow" horzOverflow="overflow" vert="horz" wrap="square" lIns="91440" tIns="45720" rIns="91440" bIns="45720" numCol="1" spcCol="0" rtlCol="0" fromWordArt="0" anchor="ctr" anchorCtr="0" forceAA="0" compatLnSpc="1">
+            <a:prstTxWarp prst="textNoShape">
+              <a:avLst/>
+            </a:prstTxWarp>
+            <a:noAutofit/>
+          </a:bodyPr>
+          <a:lstStyle/>
+          <a:p>
+            <a:pPr algn="ctr"/>
+            <a:r>
+              <a:rPr lang="en-US" dirty="0"/>
+              <a:t>Performance Scores</a:t>
+            </a:r>
+          </a:p>
+          <a:p>
+            <a:pPr algn="ctr"/>
+            <a:r>
+              <a:rPr lang="en-US" sz="1400" dirty="0"/>
+              <a:t>17 variables</a:t>
+            </a:r>
+          </a:p>
+        </p:txBody>
+      </p:sp>
     </p:spTree>
     <p:extLst>
       <p:ext uri="{BB962C8B-B14F-4D97-AF65-F5344CB8AC3E}">
-        <p14:creationId xmlns:p14="http://schemas.microsoft.com/office/powerpoint/2010/main" val="788155643"/>
+        <p14:creationId xmlns:p14="http://schemas.microsoft.com/office/powerpoint/2010/main" val="2136246420"/>
       </p:ext>
     </p:extLst>
   </p:cSld>

</xml_diff>